<commit_message>
Clear placeholder text in PowerPoint slides and adjust table formatting
</commit_message>
<xml_diff>
--- a/docs/deliverables/tracking_analysis_deliverable.pptx
+++ b/docs/deliverables/tracking_analysis_deliverable.pptx
@@ -3316,7 +3316,7 @@
                     <a:lstStyle/>
                     <a:p>
                       <a:pPr>
-                        <a:defRPr b="1" sz="1000"/>
+                        <a:defRPr b="1" sz="1100"/>
                       </a:pPr>
                       <a:r>
                         <a:t>gate_key</a:t>
@@ -3331,7 +3331,7 @@
                     <a:lstStyle/>
                     <a:p>
                       <a:pPr>
-                        <a:defRPr b="1" sz="1000"/>
+                        <a:defRPr b="1" sz="1100"/>
                       </a:pPr>
                       <a:r>
                         <a:t>Gate</a:t>
@@ -3346,7 +3346,7 @@
                     <a:lstStyle/>
                     <a:p>
                       <a:pPr>
-                        <a:defRPr b="1" sz="1000"/>
+                        <a:defRPr b="1" sz="1100"/>
                       </a:pPr>
                       <a:r>
                         <a:t>Status</a:t>
@@ -3361,7 +3361,7 @@
                     <a:lstStyle/>
                     <a:p>
                       <a:pPr>
-                        <a:defRPr b="1" sz="1000"/>
+                        <a:defRPr b="1" sz="1100"/>
                       </a:pPr>
                       <a:r>
                         <a:t>Value</a:t>
@@ -3376,7 +3376,7 @@
                     <a:lstStyle/>
                     <a:p>
                       <a:pPr>
-                        <a:defRPr b="1" sz="1000"/>
+                        <a:defRPr b="1" sz="1100"/>
                       </a:pPr>
                       <a:r>
                         <a:t>Threshold</a:t>
@@ -3391,7 +3391,7 @@
                     <a:lstStyle/>
                     <a:p>
                       <a:pPr>
-                        <a:defRPr b="1" sz="1000"/>
+                        <a:defRPr b="1" sz="1100"/>
                       </a:pPr>
                       <a:r>
                         <a:t>Direction</a:t>
@@ -3406,7 +3406,7 @@
                     <a:lstStyle/>
                     <a:p>
                       <a:pPr>
-                        <a:defRPr b="1" sz="1000"/>
+                        <a:defRPr b="1" sz="1100"/>
                       </a:pPr>
                       <a:r>
                         <a:t>Unit</a:t>
@@ -3421,7 +3421,7 @@
                     <a:lstStyle/>
                     <a:p>
                       <a:pPr>
-                        <a:defRPr b="1" sz="1000"/>
+                        <a:defRPr b="1" sz="1100"/>
                       </a:pPr>
                       <a:r>
                         <a:t>Notes</a:t>
@@ -3438,7 +3438,7 @@
                     <a:lstStyle/>
                     <a:p>
                       <a:pPr>
-                        <a:defRPr sz="900"/>
+                        <a:defRPr sz="1000"/>
                       </a:pPr>
                       <a:r>
                         <a:t>cadence_on_target_pct</a:t>
@@ -3453,7 +3453,7 @@
                     <a:lstStyle/>
                     <a:p>
                       <a:pPr>
-                        <a:defRPr sz="900"/>
+                        <a:defRPr sz="1000"/>
                       </a:pPr>
                       <a:r>
                         <a:t>Cadence on target (%)</a:t>
@@ -3468,7 +3468,7 @@
                     <a:lstStyle/>
                     <a:p>
                       <a:pPr>
-                        <a:defRPr sz="900"/>
+                        <a:defRPr sz="1000"/>
                       </a:pPr>
                       <a:r>
                         <a:t>PASS</a:t>
@@ -3483,37 +3483,37 @@
                     <a:lstStyle/>
                     <a:p>
                       <a:pPr>
-                        <a:defRPr sz="900"/>
-                      </a:pPr>
-                      <a:r>
-                        <a:t>99.99</a:t>
-                      </a:r>
-                    </a:p>
-                  </a:txBody>
-                  <a:tcPr/>
-                </a:tc>
-                <a:tc>
-                  <a:txBody>
-                    <a:bodyPr/>
-                    <a:lstStyle/>
-                    <a:p>
-                      <a:pPr>
-                        <a:defRPr sz="900"/>
-                      </a:pPr>
-                      <a:r>
-                        <a:t>95</a:t>
-                      </a:r>
-                    </a:p>
-                  </a:txBody>
-                  <a:tcPr/>
-                </a:tc>
-                <a:tc>
-                  <a:txBody>
-                    <a:bodyPr/>
-                    <a:lstStyle/>
-                    <a:p>
-                      <a:pPr>
-                        <a:defRPr sz="900"/>
+                        <a:defRPr sz="1000"/>
+                      </a:pPr>
+                      <a:r>
+                        <a:t>100.0</a:t>
+                      </a:r>
+                    </a:p>
+                  </a:txBody>
+                  <a:tcPr/>
+                </a:tc>
+                <a:tc>
+                  <a:txBody>
+                    <a:bodyPr/>
+                    <a:lstStyle/>
+                    <a:p>
+                      <a:pPr>
+                        <a:defRPr sz="1000"/>
+                      </a:pPr>
+                      <a:r>
+                        <a:t>95.0</a:t>
+                      </a:r>
+                    </a:p>
+                  </a:txBody>
+                  <a:tcPr/>
+                </a:tc>
+                <a:tc>
+                  <a:txBody>
+                    <a:bodyPr/>
+                    <a:lstStyle/>
+                    <a:p>
+                      <a:pPr>
+                        <a:defRPr sz="1000"/>
                       </a:pPr>
                       <a:r>
                         <a:t>&gt;=</a:t>
@@ -3528,7 +3528,7 @@
                     <a:lstStyle/>
                     <a:p>
                       <a:pPr>
-                        <a:defRPr sz="900"/>
+                        <a:defRPr sz="1000"/>
                       </a:pPr>
                       <a:r>
                         <a:t>%</a:t>
@@ -3543,7 +3543,7 @@
                     <a:lstStyle/>
                     <a:p>
                       <a:pPr>
-                        <a:defRPr sz="900"/>
+                        <a:defRPr sz="1000"/>
                       </a:pPr>
                       <a:r>
                         <a:t>100.0% on-target cadence; gaps above 0.15s: 6 samples.</a:t>
@@ -3560,7 +3560,7 @@
                     <a:lstStyle/>
                     <a:p>
                       <a:pPr>
-                        <a:defRPr sz="900"/>
+                        <a:defRPr sz="1000"/>
                       </a:pPr>
                       <a:r>
                         <a:t>max_gap_s</a:t>
@@ -3575,7 +3575,7 @@
                     <a:lstStyle/>
                     <a:p>
                       <a:pPr>
-                        <a:defRPr sz="900"/>
+                        <a:defRPr sz="1000"/>
                       </a:pPr>
                       <a:r>
                         <a:t>Max time gap (s)</a:t>
@@ -3590,7 +3590,7 @@
                     <a:lstStyle/>
                     <a:p>
                       <a:pPr>
-                        <a:defRPr sz="900"/>
+                        <a:defRPr sz="1000"/>
                       </a:pPr>
                       <a:r>
                         <a:t>WARN</a:t>
@@ -3605,37 +3605,37 @@
                     <a:lstStyle/>
                     <a:p>
                       <a:pPr>
-                        <a:defRPr sz="900"/>
-                      </a:pPr>
-                      <a:r>
-                        <a:t>80.30</a:t>
-                      </a:r>
-                    </a:p>
-                  </a:txBody>
-                  <a:tcPr/>
-                </a:tc>
-                <a:tc>
-                  <a:txBody>
-                    <a:bodyPr/>
-                    <a:lstStyle/>
-                    <a:p>
-                      <a:pPr>
-                        <a:defRPr sz="900"/>
-                      </a:pPr>
-                      <a:r>
-                        <a:t>0.50</a:t>
-                      </a:r>
-                    </a:p>
-                  </a:txBody>
-                  <a:tcPr/>
-                </a:tc>
-                <a:tc>
-                  <a:txBody>
-                    <a:bodyPr/>
-                    <a:lstStyle/>
-                    <a:p>
-                      <a:pPr>
-                        <a:defRPr sz="900"/>
+                        <a:defRPr sz="1000"/>
+                      </a:pPr>
+                      <a:r>
+                        <a:t>80.3</a:t>
+                      </a:r>
+                    </a:p>
+                  </a:txBody>
+                  <a:tcPr/>
+                </a:tc>
+                <a:tc>
+                  <a:txBody>
+                    <a:bodyPr/>
+                    <a:lstStyle/>
+                    <a:p>
+                      <a:pPr>
+                        <a:defRPr sz="1000"/>
+                      </a:pPr>
+                      <a:r>
+                        <a:t>0.5</a:t>
+                      </a:r>
+                    </a:p>
+                  </a:txBody>
+                  <a:tcPr/>
+                </a:tc>
+                <a:tc>
+                  <a:txBody>
+                    <a:bodyPr/>
+                    <a:lstStyle/>
+                    <a:p>
+                      <a:pPr>
+                        <a:defRPr sz="1000"/>
                       </a:pPr>
                       <a:r>
                         <a:t>&lt;=</a:t>
@@ -3650,7 +3650,7 @@
                     <a:lstStyle/>
                     <a:p>
                       <a:pPr>
-                        <a:defRPr sz="900"/>
+                        <a:defRPr sz="1000"/>
                       </a:pPr>
                       <a:r>
                         <a:t>s</a:t>
@@ -3665,7 +3665,7 @@
                     <a:lstStyle/>
                     <a:p>
                       <a:pPr>
-                        <a:defRPr sz="900"/>
+                        <a:defRPr sz="1000"/>
                       </a:pPr>
                       <a:r>
                         <a:t>Max dt observed 80.30s (gate limit for pass 0.50s).</a:t>
@@ -3682,7 +3682,7 @@
                     <a:lstStyle/>
                     <a:p>
                       <a:pPr>
-                        <a:defRPr sz="900"/>
+                        <a:defRPr sz="1000"/>
                       </a:pPr>
                       <a:r>
                         <a:t>improbable_jump_pct</a:t>
@@ -3697,7 +3697,7 @@
                     <a:lstStyle/>
                     <a:p>
                       <a:pPr>
-                        <a:defRPr sz="900"/>
+                        <a:defRPr sz="1000"/>
                       </a:pPr>
                       <a:r>
                         <a:t>Improbable position jump (%)</a:t>
@@ -3712,7 +3712,7 @@
                     <a:lstStyle/>
                     <a:p>
                       <a:pPr>
-                        <a:defRPr sz="900"/>
+                        <a:defRPr sz="1000"/>
                       </a:pPr>
                       <a:r>
                         <a:t>PASS</a:t>
@@ -3727,37 +3727,37 @@
                     <a:lstStyle/>
                     <a:p>
                       <a:pPr>
-                        <a:defRPr sz="900"/>
-                      </a:pPr>
-                      <a:r>
-                        <a:t>0.01</a:t>
-                      </a:r>
-                    </a:p>
-                  </a:txBody>
-                  <a:tcPr/>
-                </a:tc>
-                <a:tc>
-                  <a:txBody>
-                    <a:bodyPr/>
-                    <a:lstStyle/>
-                    <a:p>
-                      <a:pPr>
-                        <a:defRPr sz="900"/>
-                      </a:pPr>
-                      <a:r>
-                        <a:t>0.50</a:t>
-                      </a:r>
-                    </a:p>
-                  </a:txBody>
-                  <a:tcPr/>
-                </a:tc>
-                <a:tc>
-                  <a:txBody>
-                    <a:bodyPr/>
-                    <a:lstStyle/>
-                    <a:p>
-                      <a:pPr>
-                        <a:defRPr sz="900"/>
+                        <a:defRPr sz="1000"/>
+                      </a:pPr>
+                      <a:r>
+                        <a:t>0.0</a:t>
+                      </a:r>
+                    </a:p>
+                  </a:txBody>
+                  <a:tcPr/>
+                </a:tc>
+                <a:tc>
+                  <a:txBody>
+                    <a:bodyPr/>
+                    <a:lstStyle/>
+                    <a:p>
+                      <a:pPr>
+                        <a:defRPr sz="1000"/>
+                      </a:pPr>
+                      <a:r>
+                        <a:t>0.5</a:t>
+                      </a:r>
+                    </a:p>
+                  </a:txBody>
+                  <a:tcPr/>
+                </a:tc>
+                <a:tc>
+                  <a:txBody>
+                    <a:bodyPr/>
+                    <a:lstStyle/>
+                    <a:p>
+                      <a:pPr>
+                        <a:defRPr sz="1000"/>
                       </a:pPr>
                       <a:r>
                         <a:t>&lt;=</a:t>
@@ -3772,7 +3772,7 @@
                     <a:lstStyle/>
                     <a:p>
                       <a:pPr>
-                        <a:defRPr sz="900"/>
+                        <a:defRPr sz="1000"/>
                       </a:pPr>
                       <a:r>
                         <a:t>%</a:t>
@@ -3787,7 +3787,7 @@
                     <a:lstStyle/>
                     <a:p>
                       <a:pPr>
-                        <a:defRPr sz="900"/>
+                        <a:defRPr sz="1000"/>
                       </a:pPr>
                       <a:r>
                         <a:t>7 of 65410 samples imply XY speed &gt; 14.0 yd/s.</a:t>
@@ -3804,7 +3804,7 @@
                     <a:lstStyle/>
                     <a:p>
                       <a:pPr>
-                        <a:defRPr sz="900"/>
+                        <a:defRPr sz="1000"/>
                       </a:pPr>
                       <a:r>
                         <a:t>speed_alignment_corr</a:t>
@@ -3819,7 +3819,7 @@
                     <a:lstStyle/>
                     <a:p>
                       <a:pPr>
-                        <a:defRPr sz="900"/>
+                        <a:defRPr sz="1000"/>
                       </a:pPr>
                       <a:r>
                         <a:t>Provided vs derived speed correlation</a:t>
@@ -3834,7 +3834,7 @@
                     <a:lstStyle/>
                     <a:p>
                       <a:pPr>
-                        <a:defRPr sz="900"/>
+                        <a:defRPr sz="1000"/>
                       </a:pPr>
                       <a:r>
                         <a:t>PASS</a:t>
@@ -3849,37 +3849,37 @@
                     <a:lstStyle/>
                     <a:p>
                       <a:pPr>
-                        <a:defRPr sz="900"/>
-                      </a:pPr>
-                      <a:r>
-                        <a:t>0.90</a:t>
-                      </a:r>
-                    </a:p>
-                  </a:txBody>
-                  <a:tcPr/>
-                </a:tc>
-                <a:tc>
-                  <a:txBody>
-                    <a:bodyPr/>
-                    <a:lstStyle/>
-                    <a:p>
-                      <a:pPr>
-                        <a:defRPr sz="900"/>
-                      </a:pPr>
-                      <a:r>
-                        <a:t>0.80</a:t>
-                      </a:r>
-                    </a:p>
-                  </a:txBody>
-                  <a:tcPr/>
-                </a:tc>
-                <a:tc>
-                  <a:txBody>
-                    <a:bodyPr/>
-                    <a:lstStyle/>
-                    <a:p>
-                      <a:pPr>
-                        <a:defRPr sz="900"/>
+                        <a:defRPr sz="1000"/>
+                      </a:pPr>
+                      <a:r>
+                        <a:t>0.9</a:t>
+                      </a:r>
+                    </a:p>
+                  </a:txBody>
+                  <a:tcPr/>
+                </a:tc>
+                <a:tc>
+                  <a:txBody>
+                    <a:bodyPr/>
+                    <a:lstStyle/>
+                    <a:p>
+                      <a:pPr>
+                        <a:defRPr sz="1000"/>
+                      </a:pPr>
+                      <a:r>
+                        <a:t>0.8</a:t>
+                      </a:r>
+                    </a:p>
+                  </a:txBody>
+                  <a:tcPr/>
+                </a:tc>
+                <a:tc>
+                  <a:txBody>
+                    <a:bodyPr/>
+                    <a:lstStyle/>
+                    <a:p>
+                      <a:pPr>
+                        <a:defRPr sz="1000"/>
                       </a:pPr>
                       <a:r>
                         <a:t>&gt;=</a:t>
@@ -3894,7 +3894,7 @@
                     <a:lstStyle/>
                     <a:p>
                       <a:pPr>
-                        <a:defRPr sz="900"/>
+                        <a:defRPr sz="1000"/>
                       </a:pPr>
                       <a:r>
                         <a:t>r</a:t>
@@ -3909,7 +3909,7 @@
                     <a:lstStyle/>
                     <a:p>
                       <a:pPr>
-                        <a:defRPr sz="900"/>
+                        <a:defRPr sz="1000"/>
                       </a:pPr>
                       <a:r>
                         <a:t>Pearson correlation on 65410 aligned samples.</a:t>
@@ -4234,7 +4234,7 @@
                     <a:lstStyle/>
                     <a:p>
                       <a:pPr>
-                        <a:defRPr b="1" sz="1000"/>
+                        <a:defRPr b="1" sz="1100"/>
                       </a:pPr>
                       <a:r>
                         <a:t>Window duration</a:t>
@@ -4249,7 +4249,7 @@
                     <a:lstStyle/>
                     <a:p>
                       <a:pPr>
-                        <a:defRPr b="1" sz="1000"/>
+                        <a:defRPr b="1" sz="1100"/>
                       </a:pPr>
                       <a:r>
                         <a:t>Window</a:t>
@@ -4264,7 +4264,7 @@
                     <a:lstStyle/>
                     <a:p>
                       <a:pPr>
-                        <a:defRPr b="1" sz="1000"/>
+                        <a:defRPr b="1" sz="1100"/>
                       </a:pPr>
                       <a:r>
                         <a:t>Start (UTC)</a:t>
@@ -4279,7 +4279,7 @@
                     <a:lstStyle/>
                     <a:p>
                       <a:pPr>
-                        <a:defRPr b="1" sz="1000"/>
+                        <a:defRPr b="1" sz="1100"/>
                       </a:pPr>
                       <a:r>
                         <a:t>End (UTC)</a:t>
@@ -4294,7 +4294,7 @@
                     <a:lstStyle/>
                     <a:p>
                       <a:pPr>
-                        <a:defRPr b="1" sz="1000"/>
+                        <a:defRPr b="1" sz="1100"/>
                       </a:pPr>
                       <a:r>
                         <a:t>Peak intensity (yd/min)</a:t>
@@ -4309,7 +4309,7 @@
                     <a:lstStyle/>
                     <a:p>
                       <a:pPr>
-                        <a:defRPr b="1" sz="1000"/>
+                        <a:defRPr b="1" sz="1100"/>
                       </a:pPr>
                       <a:r>
                         <a:t>Distance in window (yd)</a:t>
@@ -4324,7 +4324,7 @@
                     <a:lstStyle/>
                     <a:p>
                       <a:pPr>
-                        <a:defRPr b="1" sz="1000"/>
+                        <a:defRPr b="1" sz="1100"/>
                       </a:pPr>
                       <a:r>
                         <a:t>Dominant phase</a:t>
@@ -4339,7 +4339,7 @@
                     <a:lstStyle/>
                     <a:p>
                       <a:pPr>
-                        <a:defRPr b="1" sz="1000"/>
+                        <a:defRPr b="1" sz="1100"/>
                       </a:pPr>
                       <a:r>
                         <a:t>HSR events</a:t>
@@ -4354,7 +4354,7 @@
                     <a:lstStyle/>
                     <a:p>
                       <a:pPr>
-                        <a:defRPr b="1" sz="1000"/>
+                        <a:defRPr b="1" sz="1100"/>
                       </a:pPr>
                       <a:r>
                         <a:t>Accel events</a:t>
@@ -4369,7 +4369,7 @@
                     <a:lstStyle/>
                     <a:p>
                       <a:pPr>
-                        <a:defRPr b="1" sz="1000"/>
+                        <a:defRPr b="1" sz="1100"/>
                       </a:pPr>
                       <a:r>
                         <a:t>Decel events</a:t>
@@ -4386,7 +4386,7 @@
                     <a:lstStyle/>
                     <a:p>
                       <a:pPr>
-                        <a:defRPr sz="900"/>
+                        <a:defRPr sz="1000"/>
                       </a:pPr>
                       <a:r>
                         <a:t>30s</a:t>
@@ -4401,7 +4401,7 @@
                     <a:lstStyle/>
                     <a:p>
                       <a:pPr>
-                        <a:defRPr sz="900"/>
+                        <a:defRPr sz="1000"/>
                       </a:pPr>
                       <a:r>
                         <a:t>1</a:t>
@@ -4416,7 +4416,7 @@
                     <a:lstStyle/>
                     <a:p>
                       <a:pPr>
-                        <a:defRPr sz="900"/>
+                        <a:defRPr sz="1000"/>
                       </a:pPr>
                       <a:r>
                         <a:t>19:18:54</a:t>
@@ -4431,7 +4431,7 @@
                     <a:lstStyle/>
                     <a:p>
                       <a:pPr>
-                        <a:defRPr sz="900"/>
+                        <a:defRPr sz="1000"/>
                       </a:pPr>
                       <a:r>
                         <a:t>19:19:24</a:t>
@@ -4446,37 +4446,37 @@
                     <a:lstStyle/>
                     <a:p>
                       <a:pPr>
-                        <a:defRPr sz="900"/>
-                      </a:pPr>
-                      <a:r>
-                        <a:t>197.70</a:t>
-                      </a:r>
-                    </a:p>
-                  </a:txBody>
-                  <a:tcPr/>
-                </a:tc>
-                <a:tc>
-                  <a:txBody>
-                    <a:bodyPr/>
-                    <a:lstStyle/>
-                    <a:p>
-                      <a:pPr>
-                        <a:defRPr sz="900"/>
-                      </a:pPr>
-                      <a:r>
-                        <a:t>98.80</a:t>
-                      </a:r>
-                    </a:p>
-                  </a:txBody>
-                  <a:tcPr/>
-                </a:tc>
-                <a:tc>
-                  <a:txBody>
-                    <a:bodyPr/>
-                    <a:lstStyle/>
-                    <a:p>
-                      <a:pPr>
-                        <a:defRPr sz="900"/>
+                        <a:defRPr sz="1000"/>
+                      </a:pPr>
+                      <a:r>
+                        <a:t>197.7</a:t>
+                      </a:r>
+                    </a:p>
+                  </a:txBody>
+                  <a:tcPr/>
+                </a:tc>
+                <a:tc>
+                  <a:txBody>
+                    <a:bodyPr/>
+                    <a:lstStyle/>
+                    <a:p>
+                      <a:pPr>
+                        <a:defRPr sz="1000"/>
+                      </a:pPr>
+                      <a:r>
+                        <a:t>98.8</a:t>
+                      </a:r>
+                    </a:p>
+                  </a:txBody>
+                  <a:tcPr/>
+                </a:tc>
+                <a:tc>
+                  <a:txBody>
+                    <a:bodyPr/>
+                    <a:lstStyle/>
+                    <a:p>
+                      <a:pPr>
+                        <a:defRPr sz="1000"/>
                       </a:pPr>
                       <a:r>
                         <a:t>Phase 03: Conditioning Push (Moderate)</a:t>
@@ -4491,7 +4491,7 @@
                     <a:lstStyle/>
                     <a:p>
                       <a:pPr>
-                        <a:defRPr sz="900"/>
+                        <a:defRPr sz="1000"/>
                       </a:pPr>
                       <a:r>
                         <a:t>1</a:t>
@@ -4506,7 +4506,7 @@
                     <a:lstStyle/>
                     <a:p>
                       <a:pPr>
-                        <a:defRPr sz="900"/>
+                        <a:defRPr sz="1000"/>
                       </a:pPr>
                       <a:r>
                         <a:t>0</a:t>
@@ -4521,7 +4521,7 @@
                     <a:lstStyle/>
                     <a:p>
                       <a:pPr>
-                        <a:defRPr sz="900"/>
+                        <a:defRPr sz="1000"/>
                       </a:pPr>
                       <a:r>
                         <a:t>0</a:t>
@@ -4538,7 +4538,7 @@
                     <a:lstStyle/>
                     <a:p>
                       <a:pPr>
-                        <a:defRPr sz="900"/>
+                        <a:defRPr sz="1000"/>
                       </a:pPr>
                       <a:r>
                         <a:t>30s</a:t>
@@ -4553,7 +4553,7 @@
                     <a:lstStyle/>
                     <a:p>
                       <a:pPr>
-                        <a:defRPr sz="900"/>
+                        <a:defRPr sz="1000"/>
                       </a:pPr>
                       <a:r>
                         <a:t>2</a:t>
@@ -4568,7 +4568,7 @@
                     <a:lstStyle/>
                     <a:p>
                       <a:pPr>
-                        <a:defRPr sz="900"/>
+                        <a:defRPr sz="1000"/>
                       </a:pPr>
                       <a:r>
                         <a:t>19:07:13</a:t>
@@ -4583,7 +4583,7 @@
                     <a:lstStyle/>
                     <a:p>
                       <a:pPr>
-                        <a:defRPr sz="900"/>
+                        <a:defRPr sz="1000"/>
                       </a:pPr>
                       <a:r>
                         <a:t>19:07:43</a:t>
@@ -4598,37 +4598,37 @@
                     <a:lstStyle/>
                     <a:p>
                       <a:pPr>
-                        <a:defRPr sz="900"/>
-                      </a:pPr>
-                      <a:r>
-                        <a:t>175.60</a:t>
-                      </a:r>
-                    </a:p>
-                  </a:txBody>
-                  <a:tcPr/>
-                </a:tc>
-                <a:tc>
-                  <a:txBody>
-                    <a:bodyPr/>
-                    <a:lstStyle/>
-                    <a:p>
-                      <a:pPr>
-                        <a:defRPr sz="900"/>
-                      </a:pPr>
-                      <a:r>
-                        <a:t>87.80</a:t>
-                      </a:r>
-                    </a:p>
-                  </a:txBody>
-                  <a:tcPr/>
-                </a:tc>
-                <a:tc>
-                  <a:txBody>
-                    <a:bodyPr/>
-                    <a:lstStyle/>
-                    <a:p>
-                      <a:pPr>
-                        <a:defRPr sz="900"/>
+                        <a:defRPr sz="1000"/>
+                      </a:pPr>
+                      <a:r>
+                        <a:t>175.6</a:t>
+                      </a:r>
+                    </a:p>
+                  </a:txBody>
+                  <a:tcPr/>
+                </a:tc>
+                <a:tc>
+                  <a:txBody>
+                    <a:bodyPr/>
+                    <a:lstStyle/>
+                    <a:p>
+                      <a:pPr>
+                        <a:defRPr sz="1000"/>
+                      </a:pPr>
+                      <a:r>
+                        <a:t>87.8</a:t>
+                      </a:r>
+                    </a:p>
+                  </a:txBody>
+                  <a:tcPr/>
+                </a:tc>
+                <a:tc>
+                  <a:txBody>
+                    <a:bodyPr/>
+                    <a:lstStyle/>
+                    <a:p>
+                      <a:pPr>
+                        <a:defRPr sz="1000"/>
                       </a:pPr>
                       <a:r>
                         <a:t>Phase 03: Conditioning Push (Moderate)</a:t>
@@ -4643,7 +4643,7 @@
                     <a:lstStyle/>
                     <a:p>
                       <a:pPr>
-                        <a:defRPr sz="900"/>
+                        <a:defRPr sz="1000"/>
                       </a:pPr>
                       <a:r>
                         <a:t>1</a:t>
@@ -4658,7 +4658,7 @@
                     <a:lstStyle/>
                     <a:p>
                       <a:pPr>
-                        <a:defRPr sz="900"/>
+                        <a:defRPr sz="1000"/>
                       </a:pPr>
                       <a:r>
                         <a:t>1</a:t>
@@ -4673,7 +4673,7 @@
                     <a:lstStyle/>
                     <a:p>
                       <a:pPr>
-                        <a:defRPr sz="900"/>
+                        <a:defRPr sz="1000"/>
                       </a:pPr>
                       <a:r>
                         <a:t>0</a:t>
@@ -4690,7 +4690,7 @@
                     <a:lstStyle/>
                     <a:p>
                       <a:pPr>
-                        <a:defRPr sz="900"/>
+                        <a:defRPr sz="1000"/>
                       </a:pPr>
                       <a:r>
                         <a:t>30s</a:t>
@@ -4705,7 +4705,7 @@
                     <a:lstStyle/>
                     <a:p>
                       <a:pPr>
-                        <a:defRPr sz="900"/>
+                        <a:defRPr sz="1000"/>
                       </a:pPr>
                       <a:r>
                         <a:t>3</a:t>
@@ -4720,7 +4720,7 @@
                     <a:lstStyle/>
                     <a:p>
                       <a:pPr>
-                        <a:defRPr sz="900"/>
+                        <a:defRPr sz="1000"/>
                       </a:pPr>
                       <a:r>
                         <a:t>19:41:57</a:t>
@@ -4735,7 +4735,7 @@
                     <a:lstStyle/>
                     <a:p>
                       <a:pPr>
-                        <a:defRPr sz="900"/>
+                        <a:defRPr sz="1000"/>
                       </a:pPr>
                       <a:r>
                         <a:t>19:42:27</a:t>
@@ -4750,37 +4750,37 @@
                     <a:lstStyle/>
                     <a:p>
                       <a:pPr>
-                        <a:defRPr sz="900"/>
-                      </a:pPr>
-                      <a:r>
-                        <a:t>174.40</a:t>
-                      </a:r>
-                    </a:p>
-                  </a:txBody>
-                  <a:tcPr/>
-                </a:tc>
-                <a:tc>
-                  <a:txBody>
-                    <a:bodyPr/>
-                    <a:lstStyle/>
-                    <a:p>
-                      <a:pPr>
-                        <a:defRPr sz="900"/>
-                      </a:pPr>
-                      <a:r>
-                        <a:t>87.20</a:t>
-                      </a:r>
-                    </a:p>
-                  </a:txBody>
-                  <a:tcPr/>
-                </a:tc>
-                <a:tc>
-                  <a:txBody>
-                    <a:bodyPr/>
-                    <a:lstStyle/>
-                    <a:p>
-                      <a:pPr>
-                        <a:defRPr sz="900"/>
+                        <a:defRPr sz="1000"/>
+                      </a:pPr>
+                      <a:r>
+                        <a:t>174.4</a:t>
+                      </a:r>
+                    </a:p>
+                  </a:txBody>
+                  <a:tcPr/>
+                </a:tc>
+                <a:tc>
+                  <a:txBody>
+                    <a:bodyPr/>
+                    <a:lstStyle/>
+                    <a:p>
+                      <a:pPr>
+                        <a:defRPr sz="1000"/>
+                      </a:pPr>
+                      <a:r>
+                        <a:t>87.2</a:t>
+                      </a:r>
+                    </a:p>
+                  </a:txBody>
+                  <a:tcPr/>
+                </a:tc>
+                <a:tc>
+                  <a:txBody>
+                    <a:bodyPr/>
+                    <a:lstStyle/>
+                    <a:p>
+                      <a:pPr>
+                        <a:defRPr sz="1000"/>
                       </a:pPr>
                       <a:r>
                         <a:t>Phase 03: Conditioning Push (Moderate)</a:t>
@@ -4795,7 +4795,7 @@
                     <a:lstStyle/>
                     <a:p>
                       <a:pPr>
-                        <a:defRPr sz="900"/>
+                        <a:defRPr sz="1000"/>
                       </a:pPr>
                       <a:r>
                         <a:t>1</a:t>
@@ -4810,7 +4810,7 @@
                     <a:lstStyle/>
                     <a:p>
                       <a:pPr>
-                        <a:defRPr sz="900"/>
+                        <a:defRPr sz="1000"/>
                       </a:pPr>
                       <a:r>
                         <a:t>0</a:t>
@@ -4825,7 +4825,7 @@
                     <a:lstStyle/>
                     <a:p>
                       <a:pPr>
-                        <a:defRPr sz="900"/>
+                        <a:defRPr sz="1000"/>
                       </a:pPr>
                       <a:r>
                         <a:t>0</a:t>
@@ -4961,7 +4961,7 @@
                     <a:lstStyle/>
                     <a:p>
                       <a:pPr>
-                        <a:defRPr b="1" sz="1000"/>
+                        <a:defRPr b="1" sz="1100"/>
                       </a:pPr>
                       <a:r>
                         <a:t>Window</a:t>
@@ -4976,7 +4976,7 @@
                     <a:lstStyle/>
                     <a:p>
                       <a:pPr>
-                        <a:defRPr b="1" sz="1000"/>
+                        <a:defRPr b="1" sz="1100"/>
                       </a:pPr>
                       <a:r>
                         <a:t>Peak intensity (yd/min)</a:t>
@@ -4991,7 +4991,7 @@
                     <a:lstStyle/>
                     <a:p>
                       <a:pPr>
-                        <a:defRPr b="1" sz="1000"/>
+                        <a:defRPr b="1" sz="1100"/>
                       </a:pPr>
                       <a:r>
                         <a:t>Best distance (yd)</a:t>
@@ -5006,7 +5006,7 @@
                     <a:lstStyle/>
                     <a:p>
                       <a:pPr>
-                        <a:defRPr b="1" sz="1000"/>
+                        <a:defRPr b="1" sz="1100"/>
                       </a:pPr>
                       <a:r>
                         <a:t>Start (UTC)</a:t>
@@ -5021,7 +5021,7 @@
                     <a:lstStyle/>
                     <a:p>
                       <a:pPr>
-                        <a:defRPr b="1" sz="1000"/>
+                        <a:defRPr b="1" sz="1100"/>
                       </a:pPr>
                       <a:r>
                         <a:t>End (UTC)</a:t>
@@ -5038,7 +5038,7 @@
                     <a:lstStyle/>
                     <a:p>
                       <a:pPr>
-                        <a:defRPr sz="900"/>
+                        <a:defRPr sz="1000"/>
                       </a:pPr>
                       <a:r>
                         <a:t>30s</a:t>
@@ -5053,37 +5053,37 @@
                     <a:lstStyle/>
                     <a:p>
                       <a:pPr>
-                        <a:defRPr sz="900"/>
-                      </a:pPr>
-                      <a:r>
-                        <a:t>197.70</a:t>
-                      </a:r>
-                    </a:p>
-                  </a:txBody>
-                  <a:tcPr/>
-                </a:tc>
-                <a:tc>
-                  <a:txBody>
-                    <a:bodyPr/>
-                    <a:lstStyle/>
-                    <a:p>
-                      <a:pPr>
-                        <a:defRPr sz="900"/>
-                      </a:pPr>
-                      <a:r>
-                        <a:t>98.80</a:t>
-                      </a:r>
-                    </a:p>
-                  </a:txBody>
-                  <a:tcPr/>
-                </a:tc>
-                <a:tc>
-                  <a:txBody>
-                    <a:bodyPr/>
-                    <a:lstStyle/>
-                    <a:p>
-                      <a:pPr>
-                        <a:defRPr sz="900"/>
+                        <a:defRPr sz="1000"/>
+                      </a:pPr>
+                      <a:r>
+                        <a:t>197.7</a:t>
+                      </a:r>
+                    </a:p>
+                  </a:txBody>
+                  <a:tcPr/>
+                </a:tc>
+                <a:tc>
+                  <a:txBody>
+                    <a:bodyPr/>
+                    <a:lstStyle/>
+                    <a:p>
+                      <a:pPr>
+                        <a:defRPr sz="1000"/>
+                      </a:pPr>
+                      <a:r>
+                        <a:t>98.8</a:t>
+                      </a:r>
+                    </a:p>
+                  </a:txBody>
+                  <a:tcPr/>
+                </a:tc>
+                <a:tc>
+                  <a:txBody>
+                    <a:bodyPr/>
+                    <a:lstStyle/>
+                    <a:p>
+                      <a:pPr>
+                        <a:defRPr sz="1000"/>
                       </a:pPr>
                       <a:r>
                         <a:t>19:18:54</a:t>
@@ -5098,7 +5098,7 @@
                     <a:lstStyle/>
                     <a:p>
                       <a:pPr>
-                        <a:defRPr sz="900"/>
+                        <a:defRPr sz="1000"/>
                       </a:pPr>
                       <a:r>
                         <a:t>19:19:24</a:t>
@@ -5115,7 +5115,7 @@
                     <a:lstStyle/>
                     <a:p>
                       <a:pPr>
-                        <a:defRPr sz="900"/>
+                        <a:defRPr sz="1000"/>
                       </a:pPr>
                       <a:r>
                         <a:t>1m</a:t>
@@ -5130,37 +5130,37 @@
                     <a:lstStyle/>
                     <a:p>
                       <a:pPr>
-                        <a:defRPr sz="900"/>
-                      </a:pPr>
-                      <a:r>
-                        <a:t>135.10</a:t>
-                      </a:r>
-                    </a:p>
-                  </a:txBody>
-                  <a:tcPr/>
-                </a:tc>
-                <a:tc>
-                  <a:txBody>
-                    <a:bodyPr/>
-                    <a:lstStyle/>
-                    <a:p>
-                      <a:pPr>
-                        <a:defRPr sz="900"/>
-                      </a:pPr>
-                      <a:r>
-                        <a:t>135.10</a:t>
-                      </a:r>
-                    </a:p>
-                  </a:txBody>
-                  <a:tcPr/>
-                </a:tc>
-                <a:tc>
-                  <a:txBody>
-                    <a:bodyPr/>
-                    <a:lstStyle/>
-                    <a:p>
-                      <a:pPr>
-                        <a:defRPr sz="900"/>
+                        <a:defRPr sz="1000"/>
+                      </a:pPr>
+                      <a:r>
+                        <a:t>135.1</a:t>
+                      </a:r>
+                    </a:p>
+                  </a:txBody>
+                  <a:tcPr/>
+                </a:tc>
+                <a:tc>
+                  <a:txBody>
+                    <a:bodyPr/>
+                    <a:lstStyle/>
+                    <a:p>
+                      <a:pPr>
+                        <a:defRPr sz="1000"/>
+                      </a:pPr>
+                      <a:r>
+                        <a:t>135.1</a:t>
+                      </a:r>
+                    </a:p>
+                  </a:txBody>
+                  <a:tcPr/>
+                </a:tc>
+                <a:tc>
+                  <a:txBody>
+                    <a:bodyPr/>
+                    <a:lstStyle/>
+                    <a:p>
+                      <a:pPr>
+                        <a:defRPr sz="1000"/>
                       </a:pPr>
                       <a:r>
                         <a:t>19:18:09</a:t>
@@ -5175,7 +5175,7 @@
                     <a:lstStyle/>
                     <a:p>
                       <a:pPr>
-                        <a:defRPr sz="900"/>
+                        <a:defRPr sz="1000"/>
                       </a:pPr>
                       <a:r>
                         <a:t>19:19:09</a:t>
@@ -5192,7 +5192,7 @@
                     <a:lstStyle/>
                     <a:p>
                       <a:pPr>
-                        <a:defRPr sz="900"/>
+                        <a:defRPr sz="1000"/>
                       </a:pPr>
                       <a:r>
                         <a:t>3m</a:t>
@@ -5207,37 +5207,37 @@
                     <a:lstStyle/>
                     <a:p>
                       <a:pPr>
-                        <a:defRPr sz="900"/>
-                      </a:pPr>
-                      <a:r>
-                        <a:t>105.80</a:t>
-                      </a:r>
-                    </a:p>
-                  </a:txBody>
-                  <a:tcPr/>
-                </a:tc>
-                <a:tc>
-                  <a:txBody>
-                    <a:bodyPr/>
-                    <a:lstStyle/>
-                    <a:p>
-                      <a:pPr>
-                        <a:defRPr sz="900"/>
-                      </a:pPr>
-                      <a:r>
-                        <a:t>317.30</a:t>
-                      </a:r>
-                    </a:p>
-                  </a:txBody>
-                  <a:tcPr/>
-                </a:tc>
-                <a:tc>
-                  <a:txBody>
-                    <a:bodyPr/>
-                    <a:lstStyle/>
-                    <a:p>
-                      <a:pPr>
-                        <a:defRPr sz="900"/>
+                        <a:defRPr sz="1000"/>
+                      </a:pPr>
+                      <a:r>
+                        <a:t>105.8</a:t>
+                      </a:r>
+                    </a:p>
+                  </a:txBody>
+                  <a:tcPr/>
+                </a:tc>
+                <a:tc>
+                  <a:txBody>
+                    <a:bodyPr/>
+                    <a:lstStyle/>
+                    <a:p>
+                      <a:pPr>
+                        <a:defRPr sz="1000"/>
+                      </a:pPr>
+                      <a:r>
+                        <a:t>317.3</a:t>
+                      </a:r>
+                    </a:p>
+                  </a:txBody>
+                  <a:tcPr/>
+                </a:tc>
+                <a:tc>
+                  <a:txBody>
+                    <a:bodyPr/>
+                    <a:lstStyle/>
+                    <a:p>
+                      <a:pPr>
+                        <a:defRPr sz="1000"/>
                       </a:pPr>
                       <a:r>
                         <a:t>19:16:25</a:t>
@@ -5252,7 +5252,7 @@
                     <a:lstStyle/>
                     <a:p>
                       <a:pPr>
-                        <a:defRPr sz="900"/>
+                        <a:defRPr sz="1000"/>
                       </a:pPr>
                       <a:r>
                         <a:t>19:19:25</a:t>
@@ -5269,7 +5269,7 @@
                     <a:lstStyle/>
                     <a:p>
                       <a:pPr>
-                        <a:defRPr sz="900"/>
+                        <a:defRPr sz="1000"/>
                       </a:pPr>
                       <a:r>
                         <a:t>5m</a:t>
@@ -5284,37 +5284,37 @@
                     <a:lstStyle/>
                     <a:p>
                       <a:pPr>
-                        <a:defRPr sz="900"/>
-                      </a:pPr>
-                      <a:r>
-                        <a:t>86.50</a:t>
-                      </a:r>
-                    </a:p>
-                  </a:txBody>
-                  <a:tcPr/>
-                </a:tc>
-                <a:tc>
-                  <a:txBody>
-                    <a:bodyPr/>
-                    <a:lstStyle/>
-                    <a:p>
-                      <a:pPr>
-                        <a:defRPr sz="900"/>
-                      </a:pPr>
-                      <a:r>
-                        <a:t>432.40</a:t>
-                      </a:r>
-                    </a:p>
-                  </a:txBody>
-                  <a:tcPr/>
-                </a:tc>
-                <a:tc>
-                  <a:txBody>
-                    <a:bodyPr/>
-                    <a:lstStyle/>
-                    <a:p>
-                      <a:pPr>
-                        <a:defRPr sz="900"/>
+                        <a:defRPr sz="1000"/>
+                      </a:pPr>
+                      <a:r>
+                        <a:t>86.5</a:t>
+                      </a:r>
+                    </a:p>
+                  </a:txBody>
+                  <a:tcPr/>
+                </a:tc>
+                <a:tc>
+                  <a:txBody>
+                    <a:bodyPr/>
+                    <a:lstStyle/>
+                    <a:p>
+                      <a:pPr>
+                        <a:defRPr sz="1000"/>
+                      </a:pPr>
+                      <a:r>
+                        <a:t>432.4</a:t>
+                      </a:r>
+                    </a:p>
+                  </a:txBody>
+                  <a:tcPr/>
+                </a:tc>
+                <a:tc>
+                  <a:txBody>
+                    <a:bodyPr/>
+                    <a:lstStyle/>
+                    <a:p>
+                      <a:pPr>
+                        <a:defRPr sz="1000"/>
                       </a:pPr>
                       <a:r>
                         <a:t>19:15:50</a:t>
@@ -5329,7 +5329,7 @@
                     <a:lstStyle/>
                     <a:p>
                       <a:pPr>
-                        <a:defRPr sz="900"/>
+                        <a:defRPr sz="1000"/>
                       </a:pPr>
                       <a:r>
                         <a:t>19:20:50</a:t>
@@ -5376,7 +5376,7 @@
                     <a:lstStyle/>
                     <a:p>
                       <a:pPr>
-                        <a:defRPr b="1" sz="1000"/>
+                        <a:defRPr b="1" sz="1100"/>
                       </a:pPr>
                       <a:r>
                         <a:t>HSR events (&gt;=1s)</a:t>
@@ -5391,7 +5391,7 @@
                     <a:lstStyle/>
                     <a:p>
                       <a:pPr>
-                        <a:defRPr b="1" sz="1000"/>
+                        <a:defRPr b="1" sz="1100"/>
                       </a:pPr>
                       <a:r>
                         <a:t>Sprint events (&gt;=1s)</a:t>
@@ -5406,7 +5406,7 @@
                     <a:lstStyle/>
                     <a:p>
                       <a:pPr>
-                        <a:defRPr b="1" sz="1000"/>
+                        <a:defRPr b="1" sz="1100"/>
                       </a:pPr>
                       <a:r>
                         <a:t>Accel events</a:t>
@@ -5421,7 +5421,7 @@
                     <a:lstStyle/>
                     <a:p>
                       <a:pPr>
-                        <a:defRPr b="1" sz="1000"/>
+                        <a:defRPr b="1" sz="1100"/>
                       </a:pPr>
                       <a:r>
                         <a:t>Decel events</a:t>
@@ -5436,7 +5436,7 @@
                     <a:lstStyle/>
                     <a:p>
                       <a:pPr>
-                        <a:defRPr b="1" sz="1000"/>
+                        <a:defRPr b="1" sz="1100"/>
                       </a:pPr>
                       <a:r>
                         <a:t>HSR distance (yd)</a:t>
@@ -5451,7 +5451,7 @@
                     <a:lstStyle/>
                     <a:p>
                       <a:pPr>
-                        <a:defRPr b="1" sz="1000"/>
+                        <a:defRPr b="1" sz="1100"/>
                       </a:pPr>
                       <a:r>
                         <a:t>Sprint distance (yd)</a:t>
@@ -5468,7 +5468,7 @@
                     <a:lstStyle/>
                     <a:p>
                       <a:pPr>
-                        <a:defRPr sz="900"/>
+                        <a:defRPr sz="1000"/>
                       </a:pPr>
                       <a:r>
                         <a:t>6</a:t>
@@ -5483,7 +5483,7 @@
                     <a:lstStyle/>
                     <a:p>
                       <a:pPr>
-                        <a:defRPr sz="900"/>
+                        <a:defRPr sz="1000"/>
                       </a:pPr>
                       <a:r>
                         <a:t>4</a:t>
@@ -5498,7 +5498,7 @@
                     <a:lstStyle/>
                     <a:p>
                       <a:pPr>
-                        <a:defRPr sz="900"/>
+                        <a:defRPr sz="1000"/>
                       </a:pPr>
                       <a:r>
                         <a:t>20</a:t>
@@ -5513,7 +5513,7 @@
                     <a:lstStyle/>
                     <a:p>
                       <a:pPr>
-                        <a:defRPr sz="900"/>
+                        <a:defRPr sz="1000"/>
                       </a:pPr>
                       <a:r>
                         <a:t>4</a:t>
@@ -5528,25 +5528,25 @@
                     <a:lstStyle/>
                     <a:p>
                       <a:pPr>
-                        <a:defRPr sz="900"/>
-                      </a:pPr>
-                      <a:r>
-                        <a:t>216.70</a:t>
-                      </a:r>
-                    </a:p>
-                  </a:txBody>
-                  <a:tcPr/>
-                </a:tc>
-                <a:tc>
-                  <a:txBody>
-                    <a:bodyPr/>
-                    <a:lstStyle/>
-                    <a:p>
-                      <a:pPr>
-                        <a:defRPr sz="900"/>
-                      </a:pPr>
-                      <a:r>
-                        <a:t>84.40</a:t>
+                        <a:defRPr sz="1000"/>
+                      </a:pPr>
+                      <a:r>
+                        <a:t>216.7</a:t>
+                      </a:r>
+                    </a:p>
+                  </a:txBody>
+                  <a:tcPr/>
+                </a:tc>
+                <a:tc>
+                  <a:txBody>
+                    <a:bodyPr/>
+                    <a:lstStyle/>
+                    <a:p>
+                      <a:pPr>
+                        <a:defRPr sz="1000"/>
+                      </a:pPr>
+                      <a:r>
+                        <a:t>84.4</a:t>
                       </a:r>
                     </a:p>
                   </a:txBody>
@@ -5656,7 +5656,7 @@
                     <a:lstStyle/>
                     <a:p>
                       <a:pPr>
-                        <a:defRPr b="1" sz="1000"/>
+                        <a:defRPr b="1" sz="1100"/>
                       </a:pPr>
                       <a:r>
                         <a:t>Zone</a:t>
@@ -5671,7 +5671,7 @@
                     <a:lstStyle/>
                     <a:p>
                       <a:pPr>
-                        <a:defRPr b="1" sz="1000"/>
+                        <a:defRPr b="1" sz="1100"/>
                       </a:pPr>
                       <a:r>
                         <a:t>Distance (yd)</a:t>
@@ -5686,7 +5686,7 @@
                     <a:lstStyle/>
                     <a:p>
                       <a:pPr>
-                        <a:defRPr b="1" sz="1000"/>
+                        <a:defRPr b="1" sz="1100"/>
                       </a:pPr>
                       <a:r>
                         <a:t>Distance (%)</a:t>
@@ -5701,7 +5701,7 @@
                     <a:lstStyle/>
                     <a:p>
                       <a:pPr>
-                        <a:defRPr b="1" sz="1000"/>
+                        <a:defRPr b="1" sz="1100"/>
                       </a:pPr>
                       <a:r>
                         <a:t>Time (s)</a:t>
@@ -5716,7 +5716,7 @@
                     <a:lstStyle/>
                     <a:p>
                       <a:pPr>
-                        <a:defRPr b="1" sz="1000"/>
+                        <a:defRPr b="1" sz="1100"/>
                       </a:pPr>
                       <a:r>
                         <a:t>Time (%)</a:t>
@@ -5731,7 +5731,7 @@
                     <a:lstStyle/>
                     <a:p>
                       <a:pPr>
-                        <a:defRPr b="1" sz="1000"/>
+                        <a:defRPr b="1" sz="1100"/>
                       </a:pPr>
                       <a:r>
                         <a:t>Mean speed (mph)</a:t>
@@ -5748,7 +5748,7 @@
                     <a:lstStyle/>
                     <a:p>
                       <a:pPr>
-                        <a:defRPr sz="900"/>
+                        <a:defRPr sz="1000"/>
                       </a:pPr>
                       <a:r>
                         <a:t>Walk</a:t>
@@ -5763,70 +5763,70 @@
                     <a:lstStyle/>
                     <a:p>
                       <a:pPr>
-                        <a:defRPr sz="900"/>
-                      </a:pPr>
-                      <a:r>
-                        <a:t>2486.10</a:t>
-                      </a:r>
-                    </a:p>
-                  </a:txBody>
-                  <a:tcPr/>
-                </a:tc>
-                <a:tc>
-                  <a:txBody>
-                    <a:bodyPr/>
-                    <a:lstStyle/>
-                    <a:p>
-                      <a:pPr>
-                        <a:defRPr sz="900"/>
-                      </a:pPr>
-                      <a:r>
-                        <a:t>51.40</a:t>
-                      </a:r>
-                    </a:p>
-                  </a:txBody>
-                  <a:tcPr/>
-                </a:tc>
-                <a:tc>
-                  <a:txBody>
-                    <a:bodyPr/>
-                    <a:lstStyle/>
-                    <a:p>
-                      <a:pPr>
-                        <a:defRPr sz="900"/>
-                      </a:pPr>
-                      <a:r>
-                        <a:t>5879.50</a:t>
-                      </a:r>
-                    </a:p>
-                  </a:txBody>
-                  <a:tcPr/>
-                </a:tc>
-                <a:tc>
-                  <a:txBody>
-                    <a:bodyPr/>
-                    <a:lstStyle/>
-                    <a:p>
-                      <a:pPr>
-                        <a:defRPr sz="900"/>
-                      </a:pPr>
-                      <a:r>
-                        <a:t>87.30</a:t>
-                      </a:r>
-                    </a:p>
-                  </a:txBody>
-                  <a:tcPr/>
-                </a:tc>
-                <a:tc>
-                  <a:txBody>
-                    <a:bodyPr/>
-                    <a:lstStyle/>
-                    <a:p>
-                      <a:pPr>
-                        <a:defRPr sz="900"/>
-                      </a:pPr>
-                      <a:r>
-                        <a:t>0.89</a:t>
+                        <a:defRPr sz="1000"/>
+                      </a:pPr>
+                      <a:r>
+                        <a:t>2486.1</a:t>
+                      </a:r>
+                    </a:p>
+                  </a:txBody>
+                  <a:tcPr/>
+                </a:tc>
+                <a:tc>
+                  <a:txBody>
+                    <a:bodyPr/>
+                    <a:lstStyle/>
+                    <a:p>
+                      <a:pPr>
+                        <a:defRPr sz="1000"/>
+                      </a:pPr>
+                      <a:r>
+                        <a:t>51.4</a:t>
+                      </a:r>
+                    </a:p>
+                  </a:txBody>
+                  <a:tcPr/>
+                </a:tc>
+                <a:tc>
+                  <a:txBody>
+                    <a:bodyPr/>
+                    <a:lstStyle/>
+                    <a:p>
+                      <a:pPr>
+                        <a:defRPr sz="1000"/>
+                      </a:pPr>
+                      <a:r>
+                        <a:t>5879.5</a:t>
+                      </a:r>
+                    </a:p>
+                  </a:txBody>
+                  <a:tcPr/>
+                </a:tc>
+                <a:tc>
+                  <a:txBody>
+                    <a:bodyPr/>
+                    <a:lstStyle/>
+                    <a:p>
+                      <a:pPr>
+                        <a:defRPr sz="1000"/>
+                      </a:pPr>
+                      <a:r>
+                        <a:t>87.3</a:t>
+                      </a:r>
+                    </a:p>
+                  </a:txBody>
+                  <a:tcPr/>
+                </a:tc>
+                <a:tc>
+                  <a:txBody>
+                    <a:bodyPr/>
+                    <a:lstStyle/>
+                    <a:p>
+                      <a:pPr>
+                        <a:defRPr sz="1000"/>
+                      </a:pPr>
+                      <a:r>
+                        <a:t>0.9</a:t>
                       </a:r>
                     </a:p>
                   </a:txBody>
@@ -5840,7 +5840,7 @@
                     <a:lstStyle/>
                     <a:p>
                       <a:pPr>
-                        <a:defRPr sz="900"/>
+                        <a:defRPr sz="1000"/>
                       </a:pPr>
                       <a:r>
                         <a:t>Cruise</a:t>
@@ -5855,70 +5855,70 @@
                     <a:lstStyle/>
                     <a:p>
                       <a:pPr>
-                        <a:defRPr sz="900"/>
-                      </a:pPr>
-                      <a:r>
-                        <a:t>1696.80</a:t>
-                      </a:r>
-                    </a:p>
-                  </a:txBody>
-                  <a:tcPr/>
-                </a:tc>
-                <a:tc>
-                  <a:txBody>
-                    <a:bodyPr/>
-                    <a:lstStyle/>
-                    <a:p>
-                      <a:pPr>
-                        <a:defRPr sz="900"/>
-                      </a:pPr>
-                      <a:r>
-                        <a:t>35.10</a:t>
-                      </a:r>
-                    </a:p>
-                  </a:txBody>
-                  <a:tcPr/>
-                </a:tc>
-                <a:tc>
-                  <a:txBody>
-                    <a:bodyPr/>
-                    <a:lstStyle/>
-                    <a:p>
-                      <a:pPr>
-                        <a:defRPr sz="900"/>
-                      </a:pPr>
-                      <a:r>
-                        <a:t>741.40</a:t>
-                      </a:r>
-                    </a:p>
-                  </a:txBody>
-                  <a:tcPr/>
-                </a:tc>
-                <a:tc>
-                  <a:txBody>
-                    <a:bodyPr/>
-                    <a:lstStyle/>
-                    <a:p>
-                      <a:pPr>
-                        <a:defRPr sz="900"/>
-                      </a:pPr>
-                      <a:r>
-                        <a:t>11</a:t>
-                      </a:r>
-                    </a:p>
-                  </a:txBody>
-                  <a:tcPr/>
-                </a:tc>
-                <a:tc>
-                  <a:txBody>
-                    <a:bodyPr/>
-                    <a:lstStyle/>
-                    <a:p>
-                      <a:pPr>
-                        <a:defRPr sz="900"/>
-                      </a:pPr>
-                      <a:r>
-                        <a:t>4.68</a:t>
+                        <a:defRPr sz="1000"/>
+                      </a:pPr>
+                      <a:r>
+                        <a:t>1696.8</a:t>
+                      </a:r>
+                    </a:p>
+                  </a:txBody>
+                  <a:tcPr/>
+                </a:tc>
+                <a:tc>
+                  <a:txBody>
+                    <a:bodyPr/>
+                    <a:lstStyle/>
+                    <a:p>
+                      <a:pPr>
+                        <a:defRPr sz="1000"/>
+                      </a:pPr>
+                      <a:r>
+                        <a:t>35.1</a:t>
+                      </a:r>
+                    </a:p>
+                  </a:txBody>
+                  <a:tcPr/>
+                </a:tc>
+                <a:tc>
+                  <a:txBody>
+                    <a:bodyPr/>
+                    <a:lstStyle/>
+                    <a:p>
+                      <a:pPr>
+                        <a:defRPr sz="1000"/>
+                      </a:pPr>
+                      <a:r>
+                        <a:t>741.4</a:t>
+                      </a:r>
+                    </a:p>
+                  </a:txBody>
+                  <a:tcPr/>
+                </a:tc>
+                <a:tc>
+                  <a:txBody>
+                    <a:bodyPr/>
+                    <a:lstStyle/>
+                    <a:p>
+                      <a:pPr>
+                        <a:defRPr sz="1000"/>
+                      </a:pPr>
+                      <a:r>
+                        <a:t>11.0</a:t>
+                      </a:r>
+                    </a:p>
+                  </a:txBody>
+                  <a:tcPr/>
+                </a:tc>
+                <a:tc>
+                  <a:txBody>
+                    <a:bodyPr/>
+                    <a:lstStyle/>
+                    <a:p>
+                      <a:pPr>
+                        <a:defRPr sz="1000"/>
+                      </a:pPr>
+                      <a:r>
+                        <a:t>4.7</a:t>
                       </a:r>
                     </a:p>
                   </a:txBody>
@@ -5932,7 +5932,7 @@
                     <a:lstStyle/>
                     <a:p>
                       <a:pPr>
-                        <a:defRPr sz="900"/>
+                        <a:defRPr sz="1000"/>
                       </a:pPr>
                       <a:r>
                         <a:t>Run</a:t>
@@ -5947,70 +5947,70 @@
                     <a:lstStyle/>
                     <a:p>
                       <a:pPr>
-                        <a:defRPr sz="900"/>
-                      </a:pPr>
-                      <a:r>
-                        <a:t>441.10</a:t>
-                      </a:r>
-                    </a:p>
-                  </a:txBody>
-                  <a:tcPr/>
-                </a:tc>
-                <a:tc>
-                  <a:txBody>
-                    <a:bodyPr/>
-                    <a:lstStyle/>
-                    <a:p>
-                      <a:pPr>
-                        <a:defRPr sz="900"/>
-                      </a:pPr>
-                      <a:r>
-                        <a:t>9.10</a:t>
-                      </a:r>
-                    </a:p>
-                  </a:txBody>
-                  <a:tcPr/>
-                </a:tc>
-                <a:tc>
-                  <a:txBody>
-                    <a:bodyPr/>
-                    <a:lstStyle/>
-                    <a:p>
-                      <a:pPr>
-                        <a:defRPr sz="900"/>
-                      </a:pPr>
-                      <a:r>
-                        <a:t>82.90</a:t>
-                      </a:r>
-                    </a:p>
-                  </a:txBody>
-                  <a:tcPr/>
-                </a:tc>
-                <a:tc>
-                  <a:txBody>
-                    <a:bodyPr/>
-                    <a:lstStyle/>
-                    <a:p>
-                      <a:pPr>
-                        <a:defRPr sz="900"/>
-                      </a:pPr>
-                      <a:r>
-                        <a:t>1.20</a:t>
-                      </a:r>
-                    </a:p>
-                  </a:txBody>
-                  <a:tcPr/>
-                </a:tc>
-                <a:tc>
-                  <a:txBody>
-                    <a:bodyPr/>
-                    <a:lstStyle/>
-                    <a:p>
-                      <a:pPr>
-                        <a:defRPr sz="900"/>
-                      </a:pPr>
-                      <a:r>
-                        <a:t>10.88</a:t>
+                        <a:defRPr sz="1000"/>
+                      </a:pPr>
+                      <a:r>
+                        <a:t>441.1</a:t>
+                      </a:r>
+                    </a:p>
+                  </a:txBody>
+                  <a:tcPr/>
+                </a:tc>
+                <a:tc>
+                  <a:txBody>
+                    <a:bodyPr/>
+                    <a:lstStyle/>
+                    <a:p>
+                      <a:pPr>
+                        <a:defRPr sz="1000"/>
+                      </a:pPr>
+                      <a:r>
+                        <a:t>9.1</a:t>
+                      </a:r>
+                    </a:p>
+                  </a:txBody>
+                  <a:tcPr/>
+                </a:tc>
+                <a:tc>
+                  <a:txBody>
+                    <a:bodyPr/>
+                    <a:lstStyle/>
+                    <a:p>
+                      <a:pPr>
+                        <a:defRPr sz="1000"/>
+                      </a:pPr>
+                      <a:r>
+                        <a:t>82.9</a:t>
+                      </a:r>
+                    </a:p>
+                  </a:txBody>
+                  <a:tcPr/>
+                </a:tc>
+                <a:tc>
+                  <a:txBody>
+                    <a:bodyPr/>
+                    <a:lstStyle/>
+                    <a:p>
+                      <a:pPr>
+                        <a:defRPr sz="1000"/>
+                      </a:pPr>
+                      <a:r>
+                        <a:t>1.2</a:t>
+                      </a:r>
+                    </a:p>
+                  </a:txBody>
+                  <a:tcPr/>
+                </a:tc>
+                <a:tc>
+                  <a:txBody>
+                    <a:bodyPr/>
+                    <a:lstStyle/>
+                    <a:p>
+                      <a:pPr>
+                        <a:defRPr sz="1000"/>
+                      </a:pPr>
+                      <a:r>
+                        <a:t>10.9</a:t>
                       </a:r>
                     </a:p>
                   </a:txBody>
@@ -6024,7 +6024,7 @@
                     <a:lstStyle/>
                     <a:p>
                       <a:pPr>
-                        <a:defRPr sz="900"/>
+                        <a:defRPr sz="1000"/>
                       </a:pPr>
                       <a:r>
                         <a:t>HSR</a:t>
@@ -6039,70 +6039,70 @@
                     <a:lstStyle/>
                     <a:p>
                       <a:pPr>
-                        <a:defRPr sz="900"/>
-                      </a:pPr>
-                      <a:r>
-                        <a:t>132.20</a:t>
-                      </a:r>
-                    </a:p>
-                  </a:txBody>
-                  <a:tcPr/>
-                </a:tc>
-                <a:tc>
-                  <a:txBody>
-                    <a:bodyPr/>
-                    <a:lstStyle/>
-                    <a:p>
-                      <a:pPr>
-                        <a:defRPr sz="900"/>
-                      </a:pPr>
-                      <a:r>
-                        <a:t>2.70</a:t>
-                      </a:r>
-                    </a:p>
-                  </a:txBody>
-                  <a:tcPr/>
-                </a:tc>
-                <a:tc>
-                  <a:txBody>
-                    <a:bodyPr/>
-                    <a:lstStyle/>
-                    <a:p>
-                      <a:pPr>
-                        <a:defRPr sz="900"/>
-                      </a:pPr>
-                      <a:r>
-                        <a:t>19.20</a:t>
-                      </a:r>
-                    </a:p>
-                  </a:txBody>
-                  <a:tcPr/>
-                </a:tc>
-                <a:tc>
-                  <a:txBody>
-                    <a:bodyPr/>
-                    <a:lstStyle/>
-                    <a:p>
-                      <a:pPr>
-                        <a:defRPr sz="900"/>
-                      </a:pPr>
-                      <a:r>
-                        <a:t>0.30</a:t>
-                      </a:r>
-                    </a:p>
-                  </a:txBody>
-                  <a:tcPr/>
-                </a:tc>
-                <a:tc>
-                  <a:txBody>
-                    <a:bodyPr/>
-                    <a:lstStyle/>
-                    <a:p>
-                      <a:pPr>
-                        <a:defRPr sz="900"/>
-                      </a:pPr>
-                      <a:r>
-                        <a:t>14.09</a:t>
+                        <a:defRPr sz="1000"/>
+                      </a:pPr>
+                      <a:r>
+                        <a:t>132.2</a:t>
+                      </a:r>
+                    </a:p>
+                  </a:txBody>
+                  <a:tcPr/>
+                </a:tc>
+                <a:tc>
+                  <a:txBody>
+                    <a:bodyPr/>
+                    <a:lstStyle/>
+                    <a:p>
+                      <a:pPr>
+                        <a:defRPr sz="1000"/>
+                      </a:pPr>
+                      <a:r>
+                        <a:t>2.7</a:t>
+                      </a:r>
+                    </a:p>
+                  </a:txBody>
+                  <a:tcPr/>
+                </a:tc>
+                <a:tc>
+                  <a:txBody>
+                    <a:bodyPr/>
+                    <a:lstStyle/>
+                    <a:p>
+                      <a:pPr>
+                        <a:defRPr sz="1000"/>
+                      </a:pPr>
+                      <a:r>
+                        <a:t>19.2</a:t>
+                      </a:r>
+                    </a:p>
+                  </a:txBody>
+                  <a:tcPr/>
+                </a:tc>
+                <a:tc>
+                  <a:txBody>
+                    <a:bodyPr/>
+                    <a:lstStyle/>
+                    <a:p>
+                      <a:pPr>
+                        <a:defRPr sz="1000"/>
+                      </a:pPr>
+                      <a:r>
+                        <a:t>0.3</a:t>
+                      </a:r>
+                    </a:p>
+                  </a:txBody>
+                  <a:tcPr/>
+                </a:tc>
+                <a:tc>
+                  <a:txBody>
+                    <a:bodyPr/>
+                    <a:lstStyle/>
+                    <a:p>
+                      <a:pPr>
+                        <a:defRPr sz="1000"/>
+                      </a:pPr>
+                      <a:r>
+                        <a:t>14.1</a:t>
                       </a:r>
                     </a:p>
                   </a:txBody>
@@ -6116,7 +6116,7 @@
                     <a:lstStyle/>
                     <a:p>
                       <a:pPr>
-                        <a:defRPr sz="900"/>
+                        <a:defRPr sz="1000"/>
                       </a:pPr>
                       <a:r>
                         <a:t>Sprint</a:t>
@@ -6131,70 +6131,70 @@
                     <a:lstStyle/>
                     <a:p>
                       <a:pPr>
-                        <a:defRPr sz="900"/>
-                      </a:pPr>
-                      <a:r>
-                        <a:t>84.40</a:t>
-                      </a:r>
-                    </a:p>
-                  </a:txBody>
-                  <a:tcPr/>
-                </a:tc>
-                <a:tc>
-                  <a:txBody>
-                    <a:bodyPr/>
-                    <a:lstStyle/>
-                    <a:p>
-                      <a:pPr>
-                        <a:defRPr sz="900"/>
-                      </a:pPr>
-                      <a:r>
-                        <a:t>1.70</a:t>
-                      </a:r>
-                    </a:p>
-                  </a:txBody>
-                  <a:tcPr/>
-                </a:tc>
-                <a:tc>
-                  <a:txBody>
-                    <a:bodyPr/>
-                    <a:lstStyle/>
-                    <a:p>
-                      <a:pPr>
-                        <a:defRPr sz="900"/>
-                      </a:pPr>
-                      <a:r>
-                        <a:t>10</a:t>
-                      </a:r>
-                    </a:p>
-                  </a:txBody>
-                  <a:tcPr/>
-                </a:tc>
-                <a:tc>
-                  <a:txBody>
-                    <a:bodyPr/>
-                    <a:lstStyle/>
-                    <a:p>
-                      <a:pPr>
-                        <a:defRPr sz="900"/>
-                      </a:pPr>
-                      <a:r>
-                        <a:t>0.10</a:t>
-                      </a:r>
-                    </a:p>
-                  </a:txBody>
-                  <a:tcPr/>
-                </a:tc>
-                <a:tc>
-                  <a:txBody>
-                    <a:bodyPr/>
-                    <a:lstStyle/>
-                    <a:p>
-                      <a:pPr>
-                        <a:defRPr sz="900"/>
-                      </a:pPr>
-                      <a:r>
-                        <a:t>17.27</a:t>
+                        <a:defRPr sz="1000"/>
+                      </a:pPr>
+                      <a:r>
+                        <a:t>84.4</a:t>
+                      </a:r>
+                    </a:p>
+                  </a:txBody>
+                  <a:tcPr/>
+                </a:tc>
+                <a:tc>
+                  <a:txBody>
+                    <a:bodyPr/>
+                    <a:lstStyle/>
+                    <a:p>
+                      <a:pPr>
+                        <a:defRPr sz="1000"/>
+                      </a:pPr>
+                      <a:r>
+                        <a:t>1.7</a:t>
+                      </a:r>
+                    </a:p>
+                  </a:txBody>
+                  <a:tcPr/>
+                </a:tc>
+                <a:tc>
+                  <a:txBody>
+                    <a:bodyPr/>
+                    <a:lstStyle/>
+                    <a:p>
+                      <a:pPr>
+                        <a:defRPr sz="1000"/>
+                      </a:pPr>
+                      <a:r>
+                        <a:t>10.0</a:t>
+                      </a:r>
+                    </a:p>
+                  </a:txBody>
+                  <a:tcPr/>
+                </a:tc>
+                <a:tc>
+                  <a:txBody>
+                    <a:bodyPr/>
+                    <a:lstStyle/>
+                    <a:p>
+                      <a:pPr>
+                        <a:defRPr sz="1000"/>
+                      </a:pPr>
+                      <a:r>
+                        <a:t>0.1</a:t>
+                      </a:r>
+                    </a:p>
+                  </a:txBody>
+                  <a:tcPr/>
+                </a:tc>
+                <a:tc>
+                  <a:txBody>
+                    <a:bodyPr/>
+                    <a:lstStyle/>
+                    <a:p>
+                      <a:pPr>
+                        <a:defRPr sz="1000"/>
+                      </a:pPr>
+                      <a:r>
+                        <a:t>17.3</a:t>
                       </a:r>
                     </a:p>
                   </a:txBody>
@@ -6329,7 +6329,7 @@
         </p:nvGraphicFramePr>
         <p:xfrm>
           <a:off x="457200" y="1097280"/>
-          <a:ext cx="8229600" cy="1828800"/>
+          <a:ext cx="8229595" cy="1828800"/>
         </p:xfrm>
         <a:graphic>
           <a:graphicData uri="http://schemas.openxmlformats.org/drawingml/2006/table">
@@ -6348,7 +6348,7 @@
                 <a:gridCol w="748145"/>
                 <a:gridCol w="748145"/>
                 <a:gridCol w="748145"/>
-                <a:gridCol w="748150"/>
+                <a:gridCol w="748145"/>
               </a:tblGrid>
               <a:tr h="304800">
                 <a:tc>
@@ -6357,7 +6357,7 @@
                     <a:lstStyle/>
                     <a:p>
                       <a:pPr>
-                        <a:defRPr b="1" sz="1000"/>
+                        <a:defRPr b="1" sz="1100"/>
                       </a:pPr>
                       <a:r>
                         <a:t>Phase</a:t>
@@ -6372,7 +6372,7 @@
                     <a:lstStyle/>
                     <a:p>
                       <a:pPr>
-                        <a:defRPr b="1" sz="1000"/>
+                        <a:defRPr b="1" sz="1100"/>
                       </a:pPr>
                       <a:r>
                         <a:t>Phase type</a:t>
@@ -6387,7 +6387,7 @@
                     <a:lstStyle/>
                     <a:p>
                       <a:pPr>
-                        <a:defRPr b="1" sz="1000"/>
+                        <a:defRPr b="1" sz="1100"/>
                       </a:pPr>
                       <a:r>
                         <a:t>Intensity</a:t>
@@ -6402,7 +6402,7 @@
                     <a:lstStyle/>
                     <a:p>
                       <a:pPr>
-                        <a:defRPr b="1" sz="1000"/>
+                        <a:defRPr b="1" sz="1100"/>
                       </a:pPr>
                       <a:r>
                         <a:t>Duration (min)</a:t>
@@ -6417,7 +6417,7 @@
                     <a:lstStyle/>
                     <a:p>
                       <a:pPr>
-                        <a:defRPr b="1" sz="1000"/>
+                        <a:defRPr b="1" sz="1100"/>
                       </a:pPr>
                       <a:r>
                         <a:t>Distance (yd)</a:t>
@@ -6432,7 +6432,7 @@
                     <a:lstStyle/>
                     <a:p>
                       <a:pPr>
-                        <a:defRPr b="1" sz="1000"/>
+                        <a:defRPr b="1" sz="1100"/>
                       </a:pPr>
                       <a:r>
                         <a:t>HSR distance (yd)</a:t>
@@ -6447,7 +6447,7 @@
                     <a:lstStyle/>
                     <a:p>
                       <a:pPr>
-                        <a:defRPr b="1" sz="1000"/>
+                        <a:defRPr b="1" sz="1100"/>
                       </a:pPr>
                       <a:r>
                         <a:t>Accel events</a:t>
@@ -6462,7 +6462,7 @@
                     <a:lstStyle/>
                     <a:p>
                       <a:pPr>
-                        <a:defRPr b="1" sz="1000"/>
+                        <a:defRPr b="1" sz="1100"/>
                       </a:pPr>
                       <a:r>
                         <a:t>Decel events</a:t>
@@ -6477,7 +6477,7 @@
                     <a:lstStyle/>
                     <a:p>
                       <a:pPr>
-                        <a:defRPr b="1" sz="1000"/>
+                        <a:defRPr b="1" sz="1100"/>
                       </a:pPr>
                       <a:r>
                         <a:t>Mean speed (mph)</a:t>
@@ -6492,7 +6492,7 @@
                     <a:lstStyle/>
                     <a:p>
                       <a:pPr>
-                        <a:defRPr b="1" sz="1000"/>
+                        <a:defRPr b="1" sz="1100"/>
                       </a:pPr>
                       <a:r>
                         <a:t>Peak speed (mph)</a:t>
@@ -6507,7 +6507,7 @@
                     <a:lstStyle/>
                     <a:p>
                       <a:pPr>
-                        <a:defRPr b="1" sz="1000"/>
+                        <a:defRPr b="1" sz="1100"/>
                       </a:pPr>
                       <a:r>
                         <a:t>Peak 60s distance (yd)</a:t>
@@ -6524,7 +6524,7 @@
                     <a:lstStyle/>
                     <a:p>
                       <a:pPr>
-                        <a:defRPr sz="900"/>
+                        <a:defRPr sz="1000"/>
                       </a:pPr>
                       <a:r>
                         <a:t>Phase 03: Conditioning Push (Moderate)</a:t>
@@ -6539,7 +6539,7 @@
                     <a:lstStyle/>
                     <a:p>
                       <a:pPr>
-                        <a:defRPr sz="900"/>
+                        <a:defRPr sz="1000"/>
                       </a:pPr>
                       <a:r>
                         <a:t>Conditioning Push</a:t>
@@ -6554,7 +6554,7 @@
                     <a:lstStyle/>
                     <a:p>
                       <a:pPr>
-                        <a:defRPr sz="900"/>
+                        <a:defRPr sz="1000"/>
                       </a:pPr>
                       <a:r>
                         <a:t>Moderate</a:t>
@@ -6569,52 +6569,52 @@
                     <a:lstStyle/>
                     <a:p>
                       <a:pPr>
-                        <a:defRPr sz="900"/>
-                      </a:pPr>
-                      <a:r>
-                        <a:t>70.04</a:t>
-                      </a:r>
-                    </a:p>
-                  </a:txBody>
-                  <a:tcPr/>
-                </a:tc>
-                <a:tc>
-                  <a:txBody>
-                    <a:bodyPr/>
-                    <a:lstStyle/>
-                    <a:p>
-                      <a:pPr>
-                        <a:defRPr sz="900"/>
-                      </a:pPr>
-                      <a:r>
-                        <a:t>3089.60</a:t>
-                      </a:r>
-                    </a:p>
-                  </a:txBody>
-                  <a:tcPr/>
-                </a:tc>
-                <a:tc>
-                  <a:txBody>
-                    <a:bodyPr/>
-                    <a:lstStyle/>
-                    <a:p>
-                      <a:pPr>
-                        <a:defRPr sz="900"/>
-                      </a:pPr>
-                      <a:r>
-                        <a:t>130.50</a:t>
-                      </a:r>
-                    </a:p>
-                  </a:txBody>
-                  <a:tcPr/>
-                </a:tc>
-                <a:tc>
-                  <a:txBody>
-                    <a:bodyPr/>
-                    <a:lstStyle/>
-                    <a:p>
-                      <a:pPr>
-                        <a:defRPr sz="900"/>
+                        <a:defRPr sz="1000"/>
+                      </a:pPr>
+                      <a:r>
+                        <a:t>70.0</a:t>
+                      </a:r>
+                    </a:p>
+                  </a:txBody>
+                  <a:tcPr/>
+                </a:tc>
+                <a:tc>
+                  <a:txBody>
+                    <a:bodyPr/>
+                    <a:lstStyle/>
+                    <a:p>
+                      <a:pPr>
+                        <a:defRPr sz="1000"/>
+                      </a:pPr>
+                      <a:r>
+                        <a:t>3089.6</a:t>
+                      </a:r>
+                    </a:p>
+                  </a:txBody>
+                  <a:tcPr/>
+                </a:tc>
+                <a:tc>
+                  <a:txBody>
+                    <a:bodyPr/>
+                    <a:lstStyle/>
+                    <a:p>
+                      <a:pPr>
+                        <a:defRPr sz="1000"/>
+                      </a:pPr>
+                      <a:r>
+                        <a:t>130.5</a:t>
+                      </a:r>
+                    </a:p>
+                  </a:txBody>
+                  <a:tcPr/>
+                </a:tc>
+                <a:tc>
+                  <a:txBody>
+                    <a:bodyPr/>
+                    <a:lstStyle/>
+                    <a:p>
+                      <a:pPr>
+                        <a:defRPr sz="1000"/>
                       </a:pPr>
                       <a:r>
                         <a:t>16</a:t>
@@ -6629,7 +6629,7 @@
                     <a:lstStyle/>
                     <a:p>
                       <a:pPr>
-                        <a:defRPr sz="900"/>
+                        <a:defRPr sz="1000"/>
                       </a:pPr>
                       <a:r>
                         <a:t>4</a:t>
@@ -6644,40 +6644,40 @@
                     <a:lstStyle/>
                     <a:p>
                       <a:pPr>
-                        <a:defRPr sz="900"/>
-                      </a:pPr>
-                      <a:r>
-                        <a:t>1.50</a:t>
-                      </a:r>
-                    </a:p>
-                  </a:txBody>
-                  <a:tcPr/>
-                </a:tc>
-                <a:tc>
-                  <a:txBody>
-                    <a:bodyPr/>
-                    <a:lstStyle/>
-                    <a:p>
-                      <a:pPr>
-                        <a:defRPr sz="900"/>
-                      </a:pPr>
-                      <a:r>
-                        <a:t>17.33</a:t>
-                      </a:r>
-                    </a:p>
-                  </a:txBody>
-                  <a:tcPr/>
-                </a:tc>
-                <a:tc>
-                  <a:txBody>
-                    <a:bodyPr/>
-                    <a:lstStyle/>
-                    <a:p>
-                      <a:pPr>
-                        <a:defRPr sz="900"/>
-                      </a:pPr>
-                      <a:r>
-                        <a:t>135.10</a:t>
+                        <a:defRPr sz="1000"/>
+                      </a:pPr>
+                      <a:r>
+                        <a:t>1.5</a:t>
+                      </a:r>
+                    </a:p>
+                  </a:txBody>
+                  <a:tcPr/>
+                </a:tc>
+                <a:tc>
+                  <a:txBody>
+                    <a:bodyPr/>
+                    <a:lstStyle/>
+                    <a:p>
+                      <a:pPr>
+                        <a:defRPr sz="1000"/>
+                      </a:pPr>
+                      <a:r>
+                        <a:t>17.3</a:t>
+                      </a:r>
+                    </a:p>
+                  </a:txBody>
+                  <a:tcPr/>
+                </a:tc>
+                <a:tc>
+                  <a:txBody>
+                    <a:bodyPr/>
+                    <a:lstStyle/>
+                    <a:p>
+                      <a:pPr>
+                        <a:defRPr sz="1000"/>
+                      </a:pPr>
+                      <a:r>
+                        <a:t>135.1</a:t>
                       </a:r>
                     </a:p>
                   </a:txBody>
@@ -6691,7 +6691,7 @@
                     <a:lstStyle/>
                     <a:p>
                       <a:pPr>
-                        <a:defRPr sz="900"/>
+                        <a:defRPr sz="1000"/>
                       </a:pPr>
                       <a:r>
                         <a:t>Phase 05: Technical / Install (Low)</a:t>
@@ -6706,7 +6706,7 @@
                     <a:lstStyle/>
                     <a:p>
                       <a:pPr>
-                        <a:defRPr sz="900"/>
+                        <a:defRPr sz="1000"/>
                       </a:pPr>
                       <a:r>
                         <a:t>Technical / Install</a:t>
@@ -6721,7 +6721,7 @@
                     <a:lstStyle/>
                     <a:p>
                       <a:pPr>
-                        <a:defRPr sz="900"/>
+                        <a:defRPr sz="1000"/>
                       </a:pPr>
                       <a:r>
                         <a:t>Low</a:t>
@@ -6736,52 +6736,52 @@
                     <a:lstStyle/>
                     <a:p>
                       <a:pPr>
-                        <a:defRPr sz="900"/>
-                      </a:pPr>
-                      <a:r>
-                        <a:t>7.37</a:t>
-                      </a:r>
-                    </a:p>
-                  </a:txBody>
-                  <a:tcPr/>
-                </a:tc>
-                <a:tc>
-                  <a:txBody>
-                    <a:bodyPr/>
-                    <a:lstStyle/>
-                    <a:p>
-                      <a:pPr>
-                        <a:defRPr sz="900"/>
-                      </a:pPr>
-                      <a:r>
-                        <a:t>518.20</a:t>
-                      </a:r>
-                    </a:p>
-                  </a:txBody>
-                  <a:tcPr/>
-                </a:tc>
-                <a:tc>
-                  <a:txBody>
-                    <a:bodyPr/>
-                    <a:lstStyle/>
-                    <a:p>
-                      <a:pPr>
-                        <a:defRPr sz="900"/>
-                      </a:pPr>
-                      <a:r>
-                        <a:t>7.80</a:t>
-                      </a:r>
-                    </a:p>
-                  </a:txBody>
-                  <a:tcPr/>
-                </a:tc>
-                <a:tc>
-                  <a:txBody>
-                    <a:bodyPr/>
-                    <a:lstStyle/>
-                    <a:p>
-                      <a:pPr>
-                        <a:defRPr sz="900"/>
+                        <a:defRPr sz="1000"/>
+                      </a:pPr>
+                      <a:r>
+                        <a:t>7.4</a:t>
+                      </a:r>
+                    </a:p>
+                  </a:txBody>
+                  <a:tcPr/>
+                </a:tc>
+                <a:tc>
+                  <a:txBody>
+                    <a:bodyPr/>
+                    <a:lstStyle/>
+                    <a:p>
+                      <a:pPr>
+                        <a:defRPr sz="1000"/>
+                      </a:pPr>
+                      <a:r>
+                        <a:t>518.2</a:t>
+                      </a:r>
+                    </a:p>
+                  </a:txBody>
+                  <a:tcPr/>
+                </a:tc>
+                <a:tc>
+                  <a:txBody>
+                    <a:bodyPr/>
+                    <a:lstStyle/>
+                    <a:p>
+                      <a:pPr>
+                        <a:defRPr sz="1000"/>
+                      </a:pPr>
+                      <a:r>
+                        <a:t>7.8</a:t>
+                      </a:r>
+                    </a:p>
+                  </a:txBody>
+                  <a:tcPr/>
+                </a:tc>
+                <a:tc>
+                  <a:txBody>
+                    <a:bodyPr/>
+                    <a:lstStyle/>
+                    <a:p>
+                      <a:pPr>
+                        <a:defRPr sz="1000"/>
                       </a:pPr>
                       <a:r>
                         <a:t>2</a:t>
@@ -6796,7 +6796,7 @@
                     <a:lstStyle/>
                     <a:p>
                       <a:pPr>
-                        <a:defRPr sz="900"/>
+                        <a:defRPr sz="1000"/>
                       </a:pPr>
                       <a:r>
                         <a:t>0</a:t>
@@ -6811,40 +6811,40 @@
                     <a:lstStyle/>
                     <a:p>
                       <a:pPr>
-                        <a:defRPr sz="900"/>
-                      </a:pPr>
-                      <a:r>
-                        <a:t>2.40</a:t>
-                      </a:r>
-                    </a:p>
-                  </a:txBody>
-                  <a:tcPr/>
-                </a:tc>
-                <a:tc>
-                  <a:txBody>
-                    <a:bodyPr/>
-                    <a:lstStyle/>
-                    <a:p>
-                      <a:pPr>
-                        <a:defRPr sz="900"/>
-                      </a:pPr>
-                      <a:r>
-                        <a:t>13.51</a:t>
-                      </a:r>
-                    </a:p>
-                  </a:txBody>
-                  <a:tcPr/>
-                </a:tc>
-                <a:tc>
-                  <a:txBody>
-                    <a:bodyPr/>
-                    <a:lstStyle/>
-                    <a:p>
-                      <a:pPr>
-                        <a:defRPr sz="900"/>
-                      </a:pPr>
-                      <a:r>
-                        <a:t>127.70</a:t>
+                        <a:defRPr sz="1000"/>
+                      </a:pPr>
+                      <a:r>
+                        <a:t>2.4</a:t>
+                      </a:r>
+                    </a:p>
+                  </a:txBody>
+                  <a:tcPr/>
+                </a:tc>
+                <a:tc>
+                  <a:txBody>
+                    <a:bodyPr/>
+                    <a:lstStyle/>
+                    <a:p>
+                      <a:pPr>
+                        <a:defRPr sz="1000"/>
+                      </a:pPr>
+                      <a:r>
+                        <a:t>13.5</a:t>
+                      </a:r>
+                    </a:p>
+                  </a:txBody>
+                  <a:tcPr/>
+                </a:tc>
+                <a:tc>
+                  <a:txBody>
+                    <a:bodyPr/>
+                    <a:lstStyle/>
+                    <a:p>
+                      <a:pPr>
+                        <a:defRPr sz="1000"/>
+                      </a:pPr>
+                      <a:r>
+                        <a:t>127.7</a:t>
                       </a:r>
                     </a:p>
                   </a:txBody>
@@ -6858,7 +6858,7 @@
                     <a:lstStyle/>
                     <a:p>
                       <a:pPr>
-                        <a:defRPr sz="900"/>
+                        <a:defRPr sz="1000"/>
                       </a:pPr>
                       <a:r>
                         <a:t>Phase 01: Warm-up (Low)</a:t>
@@ -6873,7 +6873,7 @@
                     <a:lstStyle/>
                     <a:p>
                       <a:pPr>
-                        <a:defRPr sz="900"/>
+                        <a:defRPr sz="1000"/>
                       </a:pPr>
                       <a:r>
                         <a:t>Warm-up</a:t>
@@ -6888,7 +6888,7 @@
                     <a:lstStyle/>
                     <a:p>
                       <a:pPr>
-                        <a:defRPr sz="900"/>
+                        <a:defRPr sz="1000"/>
                       </a:pPr>
                       <a:r>
                         <a:t>Low</a:t>
@@ -6903,37 +6903,52 @@
                     <a:lstStyle/>
                     <a:p>
                       <a:pPr>
-                        <a:defRPr sz="900"/>
-                      </a:pPr>
-                      <a:r>
-                        <a:t>12.81</a:t>
-                      </a:r>
-                    </a:p>
-                  </a:txBody>
-                  <a:tcPr/>
-                </a:tc>
-                <a:tc>
-                  <a:txBody>
-                    <a:bodyPr/>
-                    <a:lstStyle/>
-                    <a:p>
-                      <a:pPr>
-                        <a:defRPr sz="900"/>
-                      </a:pPr>
-                      <a:r>
-                        <a:t>389.40</a:t>
-                      </a:r>
-                    </a:p>
-                  </a:txBody>
-                  <a:tcPr/>
-                </a:tc>
-                <a:tc>
-                  <a:txBody>
-                    <a:bodyPr/>
-                    <a:lstStyle/>
-                    <a:p>
-                      <a:pPr>
-                        <a:defRPr sz="900"/>
+                        <a:defRPr sz="1000"/>
+                      </a:pPr>
+                      <a:r>
+                        <a:t>12.8</a:t>
+                      </a:r>
+                    </a:p>
+                  </a:txBody>
+                  <a:tcPr/>
+                </a:tc>
+                <a:tc>
+                  <a:txBody>
+                    <a:bodyPr/>
+                    <a:lstStyle/>
+                    <a:p>
+                      <a:pPr>
+                        <a:defRPr sz="1000"/>
+                      </a:pPr>
+                      <a:r>
+                        <a:t>389.4</a:t>
+                      </a:r>
+                    </a:p>
+                  </a:txBody>
+                  <a:tcPr/>
+                </a:tc>
+                <a:tc>
+                  <a:txBody>
+                    <a:bodyPr/>
+                    <a:lstStyle/>
+                    <a:p>
+                      <a:pPr>
+                        <a:defRPr sz="1000"/>
+                      </a:pPr>
+                      <a:r>
+                        <a:t>0.0</a:t>
+                      </a:r>
+                    </a:p>
+                  </a:txBody>
+                  <a:tcPr/>
+                </a:tc>
+                <a:tc>
+                  <a:txBody>
+                    <a:bodyPr/>
+                    <a:lstStyle/>
+                    <a:p>
+                      <a:pPr>
+                        <a:defRPr sz="1000"/>
                       </a:pPr>
                       <a:r>
                         <a:t>0</a:t>
@@ -6948,7 +6963,7 @@
                     <a:lstStyle/>
                     <a:p>
                       <a:pPr>
-                        <a:defRPr sz="900"/>
+                        <a:defRPr sz="1000"/>
                       </a:pPr>
                       <a:r>
                         <a:t>0</a:t>
@@ -6963,55 +6978,40 @@
                     <a:lstStyle/>
                     <a:p>
                       <a:pPr>
-                        <a:defRPr sz="900"/>
-                      </a:pPr>
-                      <a:r>
-                        <a:t>0</a:t>
-                      </a:r>
-                    </a:p>
-                  </a:txBody>
-                  <a:tcPr/>
-                </a:tc>
-                <a:tc>
-                  <a:txBody>
-                    <a:bodyPr/>
-                    <a:lstStyle/>
-                    <a:p>
-                      <a:pPr>
-                        <a:defRPr sz="900"/>
-                      </a:pPr>
-                      <a:r>
-                        <a:t>1.26</a:t>
-                      </a:r>
-                    </a:p>
-                  </a:txBody>
-                  <a:tcPr/>
-                </a:tc>
-                <a:tc>
-                  <a:txBody>
-                    <a:bodyPr/>
-                    <a:lstStyle/>
-                    <a:p>
-                      <a:pPr>
-                        <a:defRPr sz="900"/>
-                      </a:pPr>
-                      <a:r>
-                        <a:t>4.22</a:t>
-                      </a:r>
-                    </a:p>
-                  </a:txBody>
-                  <a:tcPr/>
-                </a:tc>
-                <a:tc>
-                  <a:txBody>
-                    <a:bodyPr/>
-                    <a:lstStyle/>
-                    <a:p>
-                      <a:pPr>
-                        <a:defRPr sz="900"/>
-                      </a:pPr>
-                      <a:r>
-                        <a:t>64.20</a:t>
+                        <a:defRPr sz="1000"/>
+                      </a:pPr>
+                      <a:r>
+                        <a:t>1.3</a:t>
+                      </a:r>
+                    </a:p>
+                  </a:txBody>
+                  <a:tcPr/>
+                </a:tc>
+                <a:tc>
+                  <a:txBody>
+                    <a:bodyPr/>
+                    <a:lstStyle/>
+                    <a:p>
+                      <a:pPr>
+                        <a:defRPr sz="1000"/>
+                      </a:pPr>
+                      <a:r>
+                        <a:t>4.2</a:t>
+                      </a:r>
+                    </a:p>
+                  </a:txBody>
+                  <a:tcPr/>
+                </a:tc>
+                <a:tc>
+                  <a:txBody>
+                    <a:bodyPr/>
+                    <a:lstStyle/>
+                    <a:p>
+                      <a:pPr>
+                        <a:defRPr sz="1000"/>
+                      </a:pPr>
+                      <a:r>
+                        <a:t>64.2</a:t>
                       </a:r>
                     </a:p>
                   </a:txBody>
@@ -7025,7 +7025,7 @@
                     <a:lstStyle/>
                     <a:p>
                       <a:pPr>
-                        <a:defRPr sz="900"/>
+                        <a:defRPr sz="1000"/>
                       </a:pPr>
                       <a:r>
                         <a:t>Phase 07: Conditioning Push (High)</a:t>
@@ -7040,7 +7040,7 @@
                     <a:lstStyle/>
                     <a:p>
                       <a:pPr>
-                        <a:defRPr sz="900"/>
+                        <a:defRPr sz="1000"/>
                       </a:pPr>
                       <a:r>
                         <a:t>Conditioning Push</a:t>
@@ -7055,7 +7055,7 @@
                     <a:lstStyle/>
                     <a:p>
                       <a:pPr>
-                        <a:defRPr sz="900"/>
+                        <a:defRPr sz="1000"/>
                       </a:pPr>
                       <a:r>
                         <a:t>High</a:t>
@@ -7070,52 +7070,52 @@
                     <a:lstStyle/>
                     <a:p>
                       <a:pPr>
-                        <a:defRPr sz="900"/>
-                      </a:pPr>
-                      <a:r>
-                        <a:t>4.75</a:t>
-                      </a:r>
-                    </a:p>
-                  </a:txBody>
-                  <a:tcPr/>
-                </a:tc>
-                <a:tc>
-                  <a:txBody>
-                    <a:bodyPr/>
-                    <a:lstStyle/>
-                    <a:p>
-                      <a:pPr>
-                        <a:defRPr sz="900"/>
-                      </a:pPr>
-                      <a:r>
-                        <a:t>365.90</a:t>
-                      </a:r>
-                    </a:p>
-                  </a:txBody>
-                  <a:tcPr/>
-                </a:tc>
-                <a:tc>
-                  <a:txBody>
-                    <a:bodyPr/>
-                    <a:lstStyle/>
-                    <a:p>
-                      <a:pPr>
-                        <a:defRPr sz="900"/>
-                      </a:pPr>
-                      <a:r>
-                        <a:t>78.30</a:t>
-                      </a:r>
-                    </a:p>
-                  </a:txBody>
-                  <a:tcPr/>
-                </a:tc>
-                <a:tc>
-                  <a:txBody>
-                    <a:bodyPr/>
-                    <a:lstStyle/>
-                    <a:p>
-                      <a:pPr>
-                        <a:defRPr sz="900"/>
+                        <a:defRPr sz="1000"/>
+                      </a:pPr>
+                      <a:r>
+                        <a:t>4.8</a:t>
+                      </a:r>
+                    </a:p>
+                  </a:txBody>
+                  <a:tcPr/>
+                </a:tc>
+                <a:tc>
+                  <a:txBody>
+                    <a:bodyPr/>
+                    <a:lstStyle/>
+                    <a:p>
+                      <a:pPr>
+                        <a:defRPr sz="1000"/>
+                      </a:pPr>
+                      <a:r>
+                        <a:t>365.9</a:t>
+                      </a:r>
+                    </a:p>
+                  </a:txBody>
+                  <a:tcPr/>
+                </a:tc>
+                <a:tc>
+                  <a:txBody>
+                    <a:bodyPr/>
+                    <a:lstStyle/>
+                    <a:p>
+                      <a:pPr>
+                        <a:defRPr sz="1000"/>
+                      </a:pPr>
+                      <a:r>
+                        <a:t>78.3</a:t>
+                      </a:r>
+                    </a:p>
+                  </a:txBody>
+                  <a:tcPr/>
+                </a:tc>
+                <a:tc>
+                  <a:txBody>
+                    <a:bodyPr/>
+                    <a:lstStyle/>
+                    <a:p>
+                      <a:pPr>
+                        <a:defRPr sz="1000"/>
                       </a:pPr>
                       <a:r>
                         <a:t>1</a:t>
@@ -7130,7 +7130,7 @@
                     <a:lstStyle/>
                     <a:p>
                       <a:pPr>
-                        <a:defRPr sz="900"/>
+                        <a:defRPr sz="1000"/>
                       </a:pPr>
                       <a:r>
                         <a:t>0</a:t>
@@ -7145,40 +7145,40 @@
                     <a:lstStyle/>
                     <a:p>
                       <a:pPr>
-                        <a:defRPr sz="900"/>
-                      </a:pPr>
-                      <a:r>
-                        <a:t>2.64</a:t>
-                      </a:r>
-                    </a:p>
-                  </a:txBody>
-                  <a:tcPr/>
-                </a:tc>
-                <a:tc>
-                  <a:txBody>
-                    <a:bodyPr/>
-                    <a:lstStyle/>
-                    <a:p>
-                      <a:pPr>
-                        <a:defRPr sz="900"/>
-                      </a:pPr>
-                      <a:r>
-                        <a:t>18.71</a:t>
-                      </a:r>
-                    </a:p>
-                  </a:txBody>
-                  <a:tcPr/>
-                </a:tc>
-                <a:tc>
-                  <a:txBody>
-                    <a:bodyPr/>
-                    <a:lstStyle/>
-                    <a:p>
-                      <a:pPr>
-                        <a:defRPr sz="900"/>
-                      </a:pPr>
-                      <a:r>
-                        <a:t>114.20</a:t>
+                        <a:defRPr sz="1000"/>
+                      </a:pPr>
+                      <a:r>
+                        <a:t>2.6</a:t>
+                      </a:r>
+                    </a:p>
+                  </a:txBody>
+                  <a:tcPr/>
+                </a:tc>
+                <a:tc>
+                  <a:txBody>
+                    <a:bodyPr/>
+                    <a:lstStyle/>
+                    <a:p>
+                      <a:pPr>
+                        <a:defRPr sz="1000"/>
+                      </a:pPr>
+                      <a:r>
+                        <a:t>18.7</a:t>
+                      </a:r>
+                    </a:p>
+                  </a:txBody>
+                  <a:tcPr/>
+                </a:tc>
+                <a:tc>
+                  <a:txBody>
+                    <a:bodyPr/>
+                    <a:lstStyle/>
+                    <a:p>
+                      <a:pPr>
+                        <a:defRPr sz="1000"/>
+                      </a:pPr>
+                      <a:r>
+                        <a:t>114.2</a:t>
                       </a:r>
                     </a:p>
                   </a:txBody>
@@ -7192,7 +7192,7 @@
                     <a:lstStyle/>
                     <a:p>
                       <a:pPr>
-                        <a:defRPr sz="900"/>
+                        <a:defRPr sz="1000"/>
                       </a:pPr>
                       <a:r>
                         <a:t>Phase 02: Technical / Install (Low)</a:t>
@@ -7207,7 +7207,7 @@
                     <a:lstStyle/>
                     <a:p>
                       <a:pPr>
-                        <a:defRPr sz="900"/>
+                        <a:defRPr sz="1000"/>
                       </a:pPr>
                       <a:r>
                         <a:t>Technical / Install</a:t>
@@ -7222,7 +7222,7 @@
                     <a:lstStyle/>
                     <a:p>
                       <a:pPr>
-                        <a:defRPr sz="900"/>
+                        <a:defRPr sz="1000"/>
                       </a:pPr>
                       <a:r>
                         <a:t>Low</a:t>
@@ -7237,37 +7237,67 @@
                     <a:lstStyle/>
                     <a:p>
                       <a:pPr>
-                        <a:defRPr sz="900"/>
-                      </a:pPr>
-                      <a:r>
-                        <a:t>3</a:t>
-                      </a:r>
-                    </a:p>
-                  </a:txBody>
-                  <a:tcPr/>
-                </a:tc>
-                <a:tc>
-                  <a:txBody>
-                    <a:bodyPr/>
-                    <a:lstStyle/>
-                    <a:p>
-                      <a:pPr>
-                        <a:defRPr sz="900"/>
-                      </a:pPr>
-                      <a:r>
-                        <a:t>277.60</a:t>
-                      </a:r>
-                    </a:p>
-                  </a:txBody>
-                  <a:tcPr/>
-                </a:tc>
-                <a:tc>
-                  <a:txBody>
-                    <a:bodyPr/>
-                    <a:lstStyle/>
-                    <a:p>
-                      <a:pPr>
-                        <a:defRPr sz="900"/>
+                        <a:defRPr sz="1000"/>
+                      </a:pPr>
+                      <a:r>
+                        <a:t>3.0</a:t>
+                      </a:r>
+                    </a:p>
+                  </a:txBody>
+                  <a:tcPr/>
+                </a:tc>
+                <a:tc>
+                  <a:txBody>
+                    <a:bodyPr/>
+                    <a:lstStyle/>
+                    <a:p>
+                      <a:pPr>
+                        <a:defRPr sz="1000"/>
+                      </a:pPr>
+                      <a:r>
+                        <a:t>277.6</a:t>
+                      </a:r>
+                    </a:p>
+                  </a:txBody>
+                  <a:tcPr/>
+                </a:tc>
+                <a:tc>
+                  <a:txBody>
+                    <a:bodyPr/>
+                    <a:lstStyle/>
+                    <a:p>
+                      <a:pPr>
+                        <a:defRPr sz="1000"/>
+                      </a:pPr>
+                      <a:r>
+                        <a:t>0.0</a:t>
+                      </a:r>
+                    </a:p>
+                  </a:txBody>
+                  <a:tcPr/>
+                </a:tc>
+                <a:tc>
+                  <a:txBody>
+                    <a:bodyPr/>
+                    <a:lstStyle/>
+                    <a:p>
+                      <a:pPr>
+                        <a:defRPr sz="1000"/>
+                      </a:pPr>
+                      <a:r>
+                        <a:t>1</a:t>
+                      </a:r>
+                    </a:p>
+                  </a:txBody>
+                  <a:tcPr/>
+                </a:tc>
+                <a:tc>
+                  <a:txBody>
+                    <a:bodyPr/>
+                    <a:lstStyle/>
+                    <a:p>
+                      <a:pPr>
+                        <a:defRPr sz="1000"/>
                       </a:pPr>
                       <a:r>
                         <a:t>0</a:t>
@@ -7282,70 +7312,40 @@
                     <a:lstStyle/>
                     <a:p>
                       <a:pPr>
-                        <a:defRPr sz="900"/>
-                      </a:pPr>
-                      <a:r>
-                        <a:t>1</a:t>
-                      </a:r>
-                    </a:p>
-                  </a:txBody>
-                  <a:tcPr/>
-                </a:tc>
-                <a:tc>
-                  <a:txBody>
-                    <a:bodyPr/>
-                    <a:lstStyle/>
-                    <a:p>
-                      <a:pPr>
-                        <a:defRPr sz="900"/>
-                      </a:pPr>
-                      <a:r>
-                        <a:t>0</a:t>
-                      </a:r>
-                    </a:p>
-                  </a:txBody>
-                  <a:tcPr/>
-                </a:tc>
-                <a:tc>
-                  <a:txBody>
-                    <a:bodyPr/>
-                    <a:lstStyle/>
-                    <a:p>
-                      <a:pPr>
-                        <a:defRPr sz="900"/>
-                      </a:pPr>
-                      <a:r>
-                        <a:t>3.16</a:t>
-                      </a:r>
-                    </a:p>
-                  </a:txBody>
-                  <a:tcPr/>
-                </a:tc>
-                <a:tc>
-                  <a:txBody>
-                    <a:bodyPr/>
-                    <a:lstStyle/>
-                    <a:p>
-                      <a:pPr>
-                        <a:defRPr sz="900"/>
-                      </a:pPr>
-                      <a:r>
-                        <a:t>8.78</a:t>
-                      </a:r>
-                    </a:p>
-                  </a:txBody>
-                  <a:tcPr/>
-                </a:tc>
-                <a:tc>
-                  <a:txBody>
-                    <a:bodyPr/>
-                    <a:lstStyle/>
-                    <a:p>
-                      <a:pPr>
-                        <a:defRPr sz="900"/>
-                      </a:pPr>
-                      <a:r>
-                        <a:t>123.50</a:t>
+                        <a:defRPr sz="1000"/>
+                      </a:pPr>
+                      <a:r>
+                        <a:t>3.2</a:t>
+                      </a:r>
+                    </a:p>
+                  </a:txBody>
+                  <a:tcPr/>
+                </a:tc>
+                <a:tc>
+                  <a:txBody>
+                    <a:bodyPr/>
+                    <a:lstStyle/>
+                    <a:p>
+                      <a:pPr>
+                        <a:defRPr sz="1000"/>
+                      </a:pPr>
+                      <a:r>
+                        <a:t>8.8</a:t>
+                      </a:r>
+                    </a:p>
+                  </a:txBody>
+                  <a:tcPr/>
+                </a:tc>
+                <a:tc>
+                  <a:txBody>
+                    <a:bodyPr/>
+                    <a:lstStyle/>
+                    <a:p>
+                      <a:pPr>
+                        <a:defRPr sz="1000"/>
+                      </a:pPr>
+                      <a:r>
+                        <a:t>123.5</a:t>
                       </a:r>
                     </a:p>
                   </a:txBody>
@@ -7395,7 +7395,7 @@
                     <a:lstStyle/>
                     <a:p>
                       <a:pPr>
-                        <a:defRPr b="1" sz="1000"/>
+                        <a:defRPr b="1" sz="1100"/>
                       </a:pPr>
                       <a:r>
                         <a:t>Period</a:t>
@@ -7410,7 +7410,7 @@
                     <a:lstStyle/>
                     <a:p>
                       <a:pPr>
-                        <a:defRPr b="1" sz="1000"/>
+                        <a:defRPr b="1" sz="1100"/>
                       </a:pPr>
                       <a:r>
                         <a:t>Duration (min)</a:t>
@@ -7425,7 +7425,7 @@
                     <a:lstStyle/>
                     <a:p>
                       <a:pPr>
-                        <a:defRPr b="1" sz="1000"/>
+                        <a:defRPr b="1" sz="1100"/>
                       </a:pPr>
                       <a:r>
                         <a:t>Distance (yd)</a:t>
@@ -7440,7 +7440,7 @@
                     <a:lstStyle/>
                     <a:p>
                       <a:pPr>
-                        <a:defRPr b="1" sz="1000"/>
+                        <a:defRPr b="1" sz="1100"/>
                       </a:pPr>
                       <a:r>
                         <a:t>Distance vs early (%)</a:t>
@@ -7455,7 +7455,7 @@
                     <a:lstStyle/>
                     <a:p>
                       <a:pPr>
-                        <a:defRPr b="1" sz="1000"/>
+                        <a:defRPr b="1" sz="1100"/>
                       </a:pPr>
                       <a:r>
                         <a:t>Mean speed (mph)</a:t>
@@ -7470,7 +7470,7 @@
                     <a:lstStyle/>
                     <a:p>
                       <a:pPr>
-                        <a:defRPr b="1" sz="1000"/>
+                        <a:defRPr b="1" sz="1100"/>
                       </a:pPr>
                       <a:r>
                         <a:t>Peak speed (mph)</a:t>
@@ -7485,7 +7485,7 @@
                     <a:lstStyle/>
                     <a:p>
                       <a:pPr>
-                        <a:defRPr b="1" sz="1000"/>
+                        <a:defRPr b="1" sz="1100"/>
                       </a:pPr>
                       <a:r>
                         <a:t>HSR distance (yd)</a:t>
@@ -7500,7 +7500,7 @@
                     <a:lstStyle/>
                     <a:p>
                       <a:pPr>
-                        <a:defRPr b="1" sz="1000"/>
+                        <a:defRPr b="1" sz="1100"/>
                       </a:pPr>
                       <a:r>
                         <a:t>Sprint distance (yd)</a:t>
@@ -7515,7 +7515,7 @@
                     <a:lstStyle/>
                     <a:p>
                       <a:pPr>
-                        <a:defRPr b="1" sz="1000"/>
+                        <a:defRPr b="1" sz="1100"/>
                       </a:pPr>
                       <a:r>
                         <a:t>HSR events</a:t>
@@ -7530,7 +7530,7 @@
                     <a:lstStyle/>
                     <a:p>
                       <a:pPr>
-                        <a:defRPr b="1" sz="1000"/>
+                        <a:defRPr b="1" sz="1100"/>
                       </a:pPr>
                       <a:r>
                         <a:t>Sprint events</a:t>
@@ -7545,7 +7545,7 @@
                     <a:lstStyle/>
                     <a:p>
                       <a:pPr>
-                        <a:defRPr b="1" sz="1000"/>
+                        <a:defRPr b="1" sz="1100"/>
                       </a:pPr>
                       <a:r>
                         <a:t>Accel events</a:t>
@@ -7560,7 +7560,7 @@
                     <a:lstStyle/>
                     <a:p>
                       <a:pPr>
-                        <a:defRPr b="1" sz="1000"/>
+                        <a:defRPr b="1" sz="1100"/>
                       </a:pPr>
                       <a:r>
                         <a:t>Decel events</a:t>
@@ -7577,7 +7577,7 @@
                     <a:lstStyle/>
                     <a:p>
                       <a:pPr>
-                        <a:defRPr sz="900"/>
+                        <a:defRPr sz="1000"/>
                       </a:pPr>
                       <a:r>
                         <a:t>Early Half</a:t>
@@ -7592,112 +7592,112 @@
                     <a:lstStyle/>
                     <a:p>
                       <a:pPr>
-                        <a:defRPr sz="900"/>
-                      </a:pPr>
-                      <a:r>
-                        <a:t>56.11</a:t>
-                      </a:r>
-                    </a:p>
-                  </a:txBody>
-                  <a:tcPr/>
-                </a:tc>
-                <a:tc>
-                  <a:txBody>
-                    <a:bodyPr/>
-                    <a:lstStyle/>
-                    <a:p>
-                      <a:pPr>
-                        <a:defRPr sz="900"/>
-                      </a:pPr>
-                      <a:r>
-                        <a:t>2,335</a:t>
-                      </a:r>
-                    </a:p>
-                  </a:txBody>
-                  <a:tcPr/>
-                </a:tc>
-                <a:tc>
-                  <a:txBody>
-                    <a:bodyPr/>
-                    <a:lstStyle/>
-                    <a:p>
-                      <a:pPr>
-                        <a:defRPr sz="900"/>
-                      </a:pPr>
-                      <a:r>
-                        <a:t>0</a:t>
-                      </a:r>
-                    </a:p>
-                  </a:txBody>
-                  <a:tcPr/>
-                </a:tc>
-                <a:tc>
-                  <a:txBody>
-                    <a:bodyPr/>
-                    <a:lstStyle/>
-                    <a:p>
-                      <a:pPr>
-                        <a:defRPr sz="900"/>
-                      </a:pPr>
-                      <a:r>
-                        <a:t>1.48</a:t>
-                      </a:r>
-                    </a:p>
-                  </a:txBody>
-                  <a:tcPr/>
-                </a:tc>
-                <a:tc>
-                  <a:txBody>
-                    <a:bodyPr/>
-                    <a:lstStyle/>
-                    <a:p>
-                      <a:pPr>
-                        <a:defRPr sz="900"/>
-                      </a:pPr>
-                      <a:r>
-                        <a:t>17.12</a:t>
-                      </a:r>
-                    </a:p>
-                  </a:txBody>
-                  <a:tcPr/>
-                </a:tc>
-                <a:tc>
-                  <a:txBody>
-                    <a:bodyPr/>
-                    <a:lstStyle/>
-                    <a:p>
-                      <a:pPr>
-                        <a:defRPr sz="900"/>
-                      </a:pPr>
-                      <a:r>
-                        <a:t>72.20</a:t>
-                      </a:r>
-                    </a:p>
-                  </a:txBody>
-                  <a:tcPr/>
-                </a:tc>
-                <a:tc>
-                  <a:txBody>
-                    <a:bodyPr/>
-                    <a:lstStyle/>
-                    <a:p>
-                      <a:pPr>
-                        <a:defRPr sz="900"/>
-                      </a:pPr>
-                      <a:r>
-                        <a:t>12.30</a:t>
-                      </a:r>
-                    </a:p>
-                  </a:txBody>
-                  <a:tcPr/>
-                </a:tc>
-                <a:tc>
-                  <a:txBody>
-                    <a:bodyPr/>
-                    <a:lstStyle/>
-                    <a:p>
-                      <a:pPr>
-                        <a:defRPr sz="900"/>
+                        <a:defRPr sz="1000"/>
+                      </a:pPr>
+                      <a:r>
+                        <a:t>56.1</a:t>
+                      </a:r>
+                    </a:p>
+                  </a:txBody>
+                  <a:tcPr/>
+                </a:tc>
+                <a:tc>
+                  <a:txBody>
+                    <a:bodyPr/>
+                    <a:lstStyle/>
+                    <a:p>
+                      <a:pPr>
+                        <a:defRPr sz="1000"/>
+                      </a:pPr>
+                      <a:r>
+                        <a:t>2335.0</a:t>
+                      </a:r>
+                    </a:p>
+                  </a:txBody>
+                  <a:tcPr/>
+                </a:tc>
+                <a:tc>
+                  <a:txBody>
+                    <a:bodyPr/>
+                    <a:lstStyle/>
+                    <a:p>
+                      <a:pPr>
+                        <a:defRPr sz="1000"/>
+                      </a:pPr>
+                      <a:r>
+                        <a:t>0.0</a:t>
+                      </a:r>
+                    </a:p>
+                  </a:txBody>
+                  <a:tcPr/>
+                </a:tc>
+                <a:tc>
+                  <a:txBody>
+                    <a:bodyPr/>
+                    <a:lstStyle/>
+                    <a:p>
+                      <a:pPr>
+                        <a:defRPr sz="1000"/>
+                      </a:pPr>
+                      <a:r>
+                        <a:t>1.5</a:t>
+                      </a:r>
+                    </a:p>
+                  </a:txBody>
+                  <a:tcPr/>
+                </a:tc>
+                <a:tc>
+                  <a:txBody>
+                    <a:bodyPr/>
+                    <a:lstStyle/>
+                    <a:p>
+                      <a:pPr>
+                        <a:defRPr sz="1000"/>
+                      </a:pPr>
+                      <a:r>
+                        <a:t>17.1</a:t>
+                      </a:r>
+                    </a:p>
+                  </a:txBody>
+                  <a:tcPr/>
+                </a:tc>
+                <a:tc>
+                  <a:txBody>
+                    <a:bodyPr/>
+                    <a:lstStyle/>
+                    <a:p>
+                      <a:pPr>
+                        <a:defRPr sz="1000"/>
+                      </a:pPr>
+                      <a:r>
+                        <a:t>72.2</a:t>
+                      </a:r>
+                    </a:p>
+                  </a:txBody>
+                  <a:tcPr/>
+                </a:tc>
+                <a:tc>
+                  <a:txBody>
+                    <a:bodyPr/>
+                    <a:lstStyle/>
+                    <a:p>
+                      <a:pPr>
+                        <a:defRPr sz="1000"/>
+                      </a:pPr>
+                      <a:r>
+                        <a:t>12.3</a:t>
+                      </a:r>
+                    </a:p>
+                  </a:txBody>
+                  <a:tcPr/>
+                </a:tc>
+                <a:tc>
+                  <a:txBody>
+                    <a:bodyPr/>
+                    <a:lstStyle/>
+                    <a:p>
+                      <a:pPr>
+                        <a:defRPr sz="1000"/>
                       </a:pPr>
                       <a:r>
                         <a:t>2</a:t>
@@ -7712,7 +7712,7 @@
                     <a:lstStyle/>
                     <a:p>
                       <a:pPr>
-                        <a:defRPr sz="900"/>
+                        <a:defRPr sz="1000"/>
                       </a:pPr>
                       <a:r>
                         <a:t>1</a:t>
@@ -7727,7 +7727,7 @@
                     <a:lstStyle/>
                     <a:p>
                       <a:pPr>
-                        <a:defRPr sz="900"/>
+                        <a:defRPr sz="1000"/>
                       </a:pPr>
                       <a:r>
                         <a:t>14</a:t>
@@ -7742,7 +7742,7 @@
                     <a:lstStyle/>
                     <a:p>
                       <a:pPr>
-                        <a:defRPr sz="900"/>
+                        <a:defRPr sz="1000"/>
                       </a:pPr>
                       <a:r>
                         <a:t>3</a:t>
@@ -7759,7 +7759,7 @@
                     <a:lstStyle/>
                     <a:p>
                       <a:pPr>
-                        <a:defRPr sz="900"/>
+                        <a:defRPr sz="1000"/>
                       </a:pPr>
                       <a:r>
                         <a:t>Late Half</a:t>
@@ -7774,112 +7774,112 @@
                     <a:lstStyle/>
                     <a:p>
                       <a:pPr>
-                        <a:defRPr sz="900"/>
-                      </a:pPr>
-                      <a:r>
-                        <a:t>56.11</a:t>
-                      </a:r>
-                    </a:p>
-                  </a:txBody>
-                  <a:tcPr/>
-                </a:tc>
-                <a:tc>
-                  <a:txBody>
-                    <a:bodyPr/>
-                    <a:lstStyle/>
-                    <a:p>
-                      <a:pPr>
-                        <a:defRPr sz="900"/>
-                      </a:pPr>
-                      <a:r>
-                        <a:t>2505.80</a:t>
-                      </a:r>
-                    </a:p>
-                  </a:txBody>
-                  <a:tcPr/>
-                </a:tc>
-                <a:tc>
-                  <a:txBody>
-                    <a:bodyPr/>
-                    <a:lstStyle/>
-                    <a:p>
-                      <a:pPr>
-                        <a:defRPr sz="900"/>
-                      </a:pPr>
-                      <a:r>
-                        <a:t>7.30</a:t>
-                      </a:r>
-                    </a:p>
-                  </a:txBody>
-                  <a:tcPr/>
-                </a:tc>
-                <a:tc>
-                  <a:txBody>
-                    <a:bodyPr/>
-                    <a:lstStyle/>
-                    <a:p>
-                      <a:pPr>
-                        <a:defRPr sz="900"/>
-                      </a:pPr>
-                      <a:r>
-                        <a:t>1.55</a:t>
-                      </a:r>
-                    </a:p>
-                  </a:txBody>
-                  <a:tcPr/>
-                </a:tc>
-                <a:tc>
-                  <a:txBody>
-                    <a:bodyPr/>
-                    <a:lstStyle/>
-                    <a:p>
-                      <a:pPr>
-                        <a:defRPr sz="900"/>
-                      </a:pPr>
-                      <a:r>
-                        <a:t>18.71</a:t>
-                      </a:r>
-                    </a:p>
-                  </a:txBody>
-                  <a:tcPr/>
-                </a:tc>
-                <a:tc>
-                  <a:txBody>
-                    <a:bodyPr/>
-                    <a:lstStyle/>
-                    <a:p>
-                      <a:pPr>
-                        <a:defRPr sz="900"/>
-                      </a:pPr>
-                      <a:r>
-                        <a:t>144.50</a:t>
-                      </a:r>
-                    </a:p>
-                  </a:txBody>
-                  <a:tcPr/>
-                </a:tc>
-                <a:tc>
-                  <a:txBody>
-                    <a:bodyPr/>
-                    <a:lstStyle/>
-                    <a:p>
-                      <a:pPr>
-                        <a:defRPr sz="900"/>
-                      </a:pPr>
-                      <a:r>
-                        <a:t>72.20</a:t>
-                      </a:r>
-                    </a:p>
-                  </a:txBody>
-                  <a:tcPr/>
-                </a:tc>
-                <a:tc>
-                  <a:txBody>
-                    <a:bodyPr/>
-                    <a:lstStyle/>
-                    <a:p>
-                      <a:pPr>
-                        <a:defRPr sz="900"/>
+                        <a:defRPr sz="1000"/>
+                      </a:pPr>
+                      <a:r>
+                        <a:t>56.1</a:t>
+                      </a:r>
+                    </a:p>
+                  </a:txBody>
+                  <a:tcPr/>
+                </a:tc>
+                <a:tc>
+                  <a:txBody>
+                    <a:bodyPr/>
+                    <a:lstStyle/>
+                    <a:p>
+                      <a:pPr>
+                        <a:defRPr sz="1000"/>
+                      </a:pPr>
+                      <a:r>
+                        <a:t>2505.8</a:t>
+                      </a:r>
+                    </a:p>
+                  </a:txBody>
+                  <a:tcPr/>
+                </a:tc>
+                <a:tc>
+                  <a:txBody>
+                    <a:bodyPr/>
+                    <a:lstStyle/>
+                    <a:p>
+                      <a:pPr>
+                        <a:defRPr sz="1000"/>
+                      </a:pPr>
+                      <a:r>
+                        <a:t>7.3</a:t>
+                      </a:r>
+                    </a:p>
+                  </a:txBody>
+                  <a:tcPr/>
+                </a:tc>
+                <a:tc>
+                  <a:txBody>
+                    <a:bodyPr/>
+                    <a:lstStyle/>
+                    <a:p>
+                      <a:pPr>
+                        <a:defRPr sz="1000"/>
+                      </a:pPr>
+                      <a:r>
+                        <a:t>1.6</a:t>
+                      </a:r>
+                    </a:p>
+                  </a:txBody>
+                  <a:tcPr/>
+                </a:tc>
+                <a:tc>
+                  <a:txBody>
+                    <a:bodyPr/>
+                    <a:lstStyle/>
+                    <a:p>
+                      <a:pPr>
+                        <a:defRPr sz="1000"/>
+                      </a:pPr>
+                      <a:r>
+                        <a:t>18.7</a:t>
+                      </a:r>
+                    </a:p>
+                  </a:txBody>
+                  <a:tcPr/>
+                </a:tc>
+                <a:tc>
+                  <a:txBody>
+                    <a:bodyPr/>
+                    <a:lstStyle/>
+                    <a:p>
+                      <a:pPr>
+                        <a:defRPr sz="1000"/>
+                      </a:pPr>
+                      <a:r>
+                        <a:t>144.5</a:t>
+                      </a:r>
+                    </a:p>
+                  </a:txBody>
+                  <a:tcPr/>
+                </a:tc>
+                <a:tc>
+                  <a:txBody>
+                    <a:bodyPr/>
+                    <a:lstStyle/>
+                    <a:p>
+                      <a:pPr>
+                        <a:defRPr sz="1000"/>
+                      </a:pPr>
+                      <a:r>
+                        <a:t>72.2</a:t>
+                      </a:r>
+                    </a:p>
+                  </a:txBody>
+                  <a:tcPr/>
+                </a:tc>
+                <a:tc>
+                  <a:txBody>
+                    <a:bodyPr/>
+                    <a:lstStyle/>
+                    <a:p>
+                      <a:pPr>
+                        <a:defRPr sz="1000"/>
                       </a:pPr>
                       <a:r>
                         <a:t>4</a:t>
@@ -7894,7 +7894,7 @@
                     <a:lstStyle/>
                     <a:p>
                       <a:pPr>
-                        <a:defRPr sz="900"/>
+                        <a:defRPr sz="1000"/>
                       </a:pPr>
                       <a:r>
                         <a:t>3</a:t>
@@ -7909,7 +7909,7 @@
                     <a:lstStyle/>
                     <a:p>
                       <a:pPr>
-                        <a:defRPr sz="900"/>
+                        <a:defRPr sz="1000"/>
                       </a:pPr>
                       <a:r>
                         <a:t>6</a:t>
@@ -7924,7 +7924,7 @@
                     <a:lstStyle/>
                     <a:p>
                       <a:pPr>
-                        <a:defRPr sz="900"/>
+                        <a:defRPr sz="1000"/>
                       </a:pPr>
                       <a:r>
                         <a:t>1</a:t>

</xml_diff>